<commit_message>
Updated presentation files and added drawio file for exchange rate merging
</commit_message>
<xml_diff>
--- a/report/presentation.pptx
+++ b/report/presentation.pptx
@@ -14,6 +14,12 @@
     <p:sldId id="259" r:id="rId11"/>
     <p:sldId id="260" r:id="rId12"/>
     <p:sldId id="261" r:id="rId13"/>
+    <p:sldId id="262" r:id="rId14"/>
+    <p:sldId id="263" r:id="rId15"/>
+    <p:sldId id="264" r:id="rId16"/>
+    <p:sldId id="265" r:id="rId17"/>
+    <p:sldId id="266" r:id="rId18"/>
+    <p:sldId id="267" r:id="rId19"/>
   </p:sldIdLst>
   <p:sldSz cx="24384000" cy="13716000"/>
   <p:notesSz cx="6858000" cy="9144000"/>
@@ -44,7 +50,7 @@
         <a:uFillTx/>
       </a:defRPr>
     </a:defPPr>
-    <a:lvl1pPr marL="0" marR="0" indent="0" algn="ctr" defTabSz="2438338" rtl="0" fontAlgn="auto" latinLnBrk="0" hangingPunct="0">
+    <a:lvl1pPr marL="0" marR="0" indent="0" algn="ctr" defTabSz="2438337" rtl="0" fontAlgn="auto" latinLnBrk="0" hangingPunct="0">
       <a:lnSpc>
         <a:spcPct val="100000"/>
       </a:lnSpc>
@@ -68,13 +74,13 @@
         </a:solidFill>
         <a:effectLst/>
         <a:uFillTx/>
-        <a:latin typeface="+mn-lt"/>
-        <a:ea typeface="+mn-ea"/>
-        <a:cs typeface="+mn-cs"/>
+        <a:latin typeface="+mj-lt"/>
+        <a:ea typeface="+mj-ea"/>
+        <a:cs typeface="+mj-cs"/>
         <a:sym typeface="Helvetica Neue"/>
       </a:defRPr>
     </a:lvl1pPr>
-    <a:lvl2pPr marL="0" marR="0" indent="457200" algn="ctr" defTabSz="2438338" rtl="0" fontAlgn="auto" latinLnBrk="0" hangingPunct="0">
+    <a:lvl2pPr marL="0" marR="0" indent="0" algn="ctr" defTabSz="2438337" rtl="0" fontAlgn="auto" latinLnBrk="0" hangingPunct="0">
       <a:lnSpc>
         <a:spcPct val="100000"/>
       </a:lnSpc>
@@ -98,13 +104,13 @@
         </a:solidFill>
         <a:effectLst/>
         <a:uFillTx/>
-        <a:latin typeface="+mn-lt"/>
-        <a:ea typeface="+mn-ea"/>
-        <a:cs typeface="+mn-cs"/>
+        <a:latin typeface="+mj-lt"/>
+        <a:ea typeface="+mj-ea"/>
+        <a:cs typeface="+mj-cs"/>
         <a:sym typeface="Helvetica Neue"/>
       </a:defRPr>
     </a:lvl2pPr>
-    <a:lvl3pPr marL="0" marR="0" indent="914400" algn="ctr" defTabSz="2438338" rtl="0" fontAlgn="auto" latinLnBrk="0" hangingPunct="0">
+    <a:lvl3pPr marL="0" marR="0" indent="0" algn="ctr" defTabSz="2438337" rtl="0" fontAlgn="auto" latinLnBrk="0" hangingPunct="0">
       <a:lnSpc>
         <a:spcPct val="100000"/>
       </a:lnSpc>
@@ -128,13 +134,13 @@
         </a:solidFill>
         <a:effectLst/>
         <a:uFillTx/>
-        <a:latin typeface="+mn-lt"/>
-        <a:ea typeface="+mn-ea"/>
-        <a:cs typeface="+mn-cs"/>
+        <a:latin typeface="+mj-lt"/>
+        <a:ea typeface="+mj-ea"/>
+        <a:cs typeface="+mj-cs"/>
         <a:sym typeface="Helvetica Neue"/>
       </a:defRPr>
     </a:lvl3pPr>
-    <a:lvl4pPr marL="0" marR="0" indent="1371600" algn="ctr" defTabSz="2438338" rtl="0" fontAlgn="auto" latinLnBrk="0" hangingPunct="0">
+    <a:lvl4pPr marL="0" marR="0" indent="0" algn="ctr" defTabSz="2438337" rtl="0" fontAlgn="auto" latinLnBrk="0" hangingPunct="0">
       <a:lnSpc>
         <a:spcPct val="100000"/>
       </a:lnSpc>
@@ -158,13 +164,13 @@
         </a:solidFill>
         <a:effectLst/>
         <a:uFillTx/>
-        <a:latin typeface="+mn-lt"/>
-        <a:ea typeface="+mn-ea"/>
-        <a:cs typeface="+mn-cs"/>
+        <a:latin typeface="+mj-lt"/>
+        <a:ea typeface="+mj-ea"/>
+        <a:cs typeface="+mj-cs"/>
         <a:sym typeface="Helvetica Neue"/>
       </a:defRPr>
     </a:lvl4pPr>
-    <a:lvl5pPr marL="0" marR="0" indent="1828800" algn="ctr" defTabSz="2438338" rtl="0" fontAlgn="auto" latinLnBrk="0" hangingPunct="0">
+    <a:lvl5pPr marL="0" marR="0" indent="0" algn="ctr" defTabSz="2438337" rtl="0" fontAlgn="auto" latinLnBrk="0" hangingPunct="0">
       <a:lnSpc>
         <a:spcPct val="100000"/>
       </a:lnSpc>
@@ -188,13 +194,13 @@
         </a:solidFill>
         <a:effectLst/>
         <a:uFillTx/>
-        <a:latin typeface="+mn-lt"/>
-        <a:ea typeface="+mn-ea"/>
-        <a:cs typeface="+mn-cs"/>
+        <a:latin typeface="+mj-lt"/>
+        <a:ea typeface="+mj-ea"/>
+        <a:cs typeface="+mj-cs"/>
         <a:sym typeface="Helvetica Neue"/>
       </a:defRPr>
     </a:lvl5pPr>
-    <a:lvl6pPr marL="0" marR="0" indent="2286000" algn="ctr" defTabSz="2438338" rtl="0" fontAlgn="auto" latinLnBrk="0" hangingPunct="0">
+    <a:lvl6pPr marL="0" marR="0" indent="0" algn="ctr" defTabSz="2438337" rtl="0" fontAlgn="auto" latinLnBrk="0" hangingPunct="0">
       <a:lnSpc>
         <a:spcPct val="100000"/>
       </a:lnSpc>
@@ -218,13 +224,13 @@
         </a:solidFill>
         <a:effectLst/>
         <a:uFillTx/>
-        <a:latin typeface="+mn-lt"/>
-        <a:ea typeface="+mn-ea"/>
-        <a:cs typeface="+mn-cs"/>
+        <a:latin typeface="+mj-lt"/>
+        <a:ea typeface="+mj-ea"/>
+        <a:cs typeface="+mj-cs"/>
         <a:sym typeface="Helvetica Neue"/>
       </a:defRPr>
     </a:lvl6pPr>
-    <a:lvl7pPr marL="0" marR="0" indent="2743200" algn="ctr" defTabSz="2438338" rtl="0" fontAlgn="auto" latinLnBrk="0" hangingPunct="0">
+    <a:lvl7pPr marL="0" marR="0" indent="0" algn="ctr" defTabSz="2438337" rtl="0" fontAlgn="auto" latinLnBrk="0" hangingPunct="0">
       <a:lnSpc>
         <a:spcPct val="100000"/>
       </a:lnSpc>
@@ -248,13 +254,13 @@
         </a:solidFill>
         <a:effectLst/>
         <a:uFillTx/>
-        <a:latin typeface="+mn-lt"/>
-        <a:ea typeface="+mn-ea"/>
-        <a:cs typeface="+mn-cs"/>
+        <a:latin typeface="+mj-lt"/>
+        <a:ea typeface="+mj-ea"/>
+        <a:cs typeface="+mj-cs"/>
         <a:sym typeface="Helvetica Neue"/>
       </a:defRPr>
     </a:lvl7pPr>
-    <a:lvl8pPr marL="0" marR="0" indent="3200400" algn="ctr" defTabSz="2438338" rtl="0" fontAlgn="auto" latinLnBrk="0" hangingPunct="0">
+    <a:lvl8pPr marL="0" marR="0" indent="0" algn="ctr" defTabSz="2438337" rtl="0" fontAlgn="auto" latinLnBrk="0" hangingPunct="0">
       <a:lnSpc>
         <a:spcPct val="100000"/>
       </a:lnSpc>
@@ -278,13 +284,13 @@
         </a:solidFill>
         <a:effectLst/>
         <a:uFillTx/>
-        <a:latin typeface="+mn-lt"/>
-        <a:ea typeface="+mn-ea"/>
-        <a:cs typeface="+mn-cs"/>
+        <a:latin typeface="+mj-lt"/>
+        <a:ea typeface="+mj-ea"/>
+        <a:cs typeface="+mj-cs"/>
         <a:sym typeface="Helvetica Neue"/>
       </a:defRPr>
     </a:lvl8pPr>
-    <a:lvl9pPr marL="0" marR="0" indent="3657600" algn="ctr" defTabSz="2438338" rtl="0" fontAlgn="auto" latinLnBrk="0" hangingPunct="0">
+    <a:lvl9pPr marL="0" marR="0" indent="0" algn="ctr" defTabSz="2438337" rtl="0" fontAlgn="auto" latinLnBrk="0" hangingPunct="0">
       <a:lnSpc>
         <a:spcPct val="100000"/>
       </a:lnSpc>
@@ -308,9 +314,9 @@
         </a:solidFill>
         <a:effectLst/>
         <a:uFillTx/>
-        <a:latin typeface="+mn-lt"/>
-        <a:ea typeface="+mn-ea"/>
-        <a:cs typeface="+mn-cs"/>
+        <a:latin typeface="+mj-lt"/>
+        <a:ea typeface="+mj-ea"/>
+        <a:cs typeface="+mj-cs"/>
         <a:sym typeface="Helvetica Neue"/>
       </a:defRPr>
     </a:lvl9pPr>
@@ -398,9 +404,9 @@
         <a:spcPct val="117999"/>
       </a:lnSpc>
       <a:defRPr sz="2200">
-        <a:latin typeface="+mn-lt"/>
-        <a:ea typeface="+mn-ea"/>
-        <a:cs typeface="+mn-cs"/>
+        <a:latin typeface="+mj-lt"/>
+        <a:ea typeface="+mj-ea"/>
+        <a:cs typeface="+mj-cs"/>
         <a:sym typeface="Helvetica Neue"/>
       </a:defRPr>
     </a:lvl1pPr>
@@ -409,9 +415,9 @@
         <a:spcPct val="117999"/>
       </a:lnSpc>
       <a:defRPr sz="2200">
-        <a:latin typeface="+mn-lt"/>
-        <a:ea typeface="+mn-ea"/>
-        <a:cs typeface="+mn-cs"/>
+        <a:latin typeface="+mj-lt"/>
+        <a:ea typeface="+mj-ea"/>
+        <a:cs typeface="+mj-cs"/>
         <a:sym typeface="Helvetica Neue"/>
       </a:defRPr>
     </a:lvl2pPr>
@@ -420,9 +426,9 @@
         <a:spcPct val="117999"/>
       </a:lnSpc>
       <a:defRPr sz="2200">
-        <a:latin typeface="+mn-lt"/>
-        <a:ea typeface="+mn-ea"/>
-        <a:cs typeface="+mn-cs"/>
+        <a:latin typeface="+mj-lt"/>
+        <a:ea typeface="+mj-ea"/>
+        <a:cs typeface="+mj-cs"/>
         <a:sym typeface="Helvetica Neue"/>
       </a:defRPr>
     </a:lvl3pPr>
@@ -431,9 +437,9 @@
         <a:spcPct val="117999"/>
       </a:lnSpc>
       <a:defRPr sz="2200">
-        <a:latin typeface="+mn-lt"/>
-        <a:ea typeface="+mn-ea"/>
-        <a:cs typeface="+mn-cs"/>
+        <a:latin typeface="+mj-lt"/>
+        <a:ea typeface="+mj-ea"/>
+        <a:cs typeface="+mj-cs"/>
         <a:sym typeface="Helvetica Neue"/>
       </a:defRPr>
     </a:lvl4pPr>
@@ -442,9 +448,9 @@
         <a:spcPct val="117999"/>
       </a:lnSpc>
       <a:defRPr sz="2200">
-        <a:latin typeface="+mn-lt"/>
-        <a:ea typeface="+mn-ea"/>
-        <a:cs typeface="+mn-cs"/>
+        <a:latin typeface="+mj-lt"/>
+        <a:ea typeface="+mj-ea"/>
+        <a:cs typeface="+mj-cs"/>
         <a:sym typeface="Helvetica Neue"/>
       </a:defRPr>
     </a:lvl5pPr>
@@ -453,9 +459,9 @@
         <a:spcPct val="117999"/>
       </a:lnSpc>
       <a:defRPr sz="2200">
-        <a:latin typeface="+mn-lt"/>
-        <a:ea typeface="+mn-ea"/>
-        <a:cs typeface="+mn-cs"/>
+        <a:latin typeface="+mj-lt"/>
+        <a:ea typeface="+mj-ea"/>
+        <a:cs typeface="+mj-cs"/>
         <a:sym typeface="Helvetica Neue"/>
       </a:defRPr>
     </a:lvl6pPr>
@@ -464,9 +470,9 @@
         <a:spcPct val="117999"/>
       </a:lnSpc>
       <a:defRPr sz="2200">
-        <a:latin typeface="+mn-lt"/>
-        <a:ea typeface="+mn-ea"/>
-        <a:cs typeface="+mn-cs"/>
+        <a:latin typeface="+mj-lt"/>
+        <a:ea typeface="+mj-ea"/>
+        <a:cs typeface="+mj-cs"/>
         <a:sym typeface="Helvetica Neue"/>
       </a:defRPr>
     </a:lvl7pPr>
@@ -475,9 +481,9 @@
         <a:spcPct val="117999"/>
       </a:lnSpc>
       <a:defRPr sz="2200">
-        <a:latin typeface="+mn-lt"/>
-        <a:ea typeface="+mn-ea"/>
-        <a:cs typeface="+mn-cs"/>
+        <a:latin typeface="+mj-lt"/>
+        <a:ea typeface="+mj-ea"/>
+        <a:cs typeface="+mj-cs"/>
         <a:sym typeface="Helvetica Neue"/>
       </a:defRPr>
     </a:lvl8pPr>
@@ -486,9 +492,9 @@
         <a:spcPct val="117999"/>
       </a:lnSpc>
       <a:defRPr sz="2200">
-        <a:latin typeface="+mn-lt"/>
-        <a:ea typeface="+mn-ea"/>
-        <a:cs typeface="+mn-cs"/>
+        <a:latin typeface="+mj-lt"/>
+        <a:ea typeface="+mj-ea"/>
+        <a:cs typeface="+mj-cs"/>
         <a:sym typeface="Helvetica Neue"/>
       </a:defRPr>
     </a:lvl9pPr>
@@ -497,7 +503,7 @@
 </file>
 
 <file path=ppt/slideLayouts/slideLayout1.xml><?xml version="1.0" encoding="utf-8"?>
-<p:sldLayout xmlns:a="http://schemas.openxmlformats.org/drawingml/2006/main" xmlns:r="http://schemas.openxmlformats.org/officeDocument/2006/relationships" xmlns:p="http://schemas.openxmlformats.org/presentationml/2006/main" xmlns:m="http://schemas.openxmlformats.org/officeDocument/2006/math" xmlns:a14="http://schemas.microsoft.com/office/drawing/2010/main" type="title" showMasterSp="1" showMasterPhAnim="1">
+<p:sldLayout xmlns:a="http://schemas.openxmlformats.org/drawingml/2006/main" xmlns:r="http://schemas.openxmlformats.org/officeDocument/2006/relationships" xmlns:p="http://schemas.openxmlformats.org/presentationml/2006/main" xmlns:m="http://schemas.openxmlformats.org/officeDocument/2006/math" xmlns:a14="http://schemas.microsoft.com/office/drawing/2010/main" type="tx" showMasterSp="1" showMasterPhAnim="1">
   <p:cSld name="Title">
     <p:spTree>
       <p:nvGrpSpPr>
@@ -515,23 +521,23 @@
       </p:grpSpPr>
       <p:sp>
         <p:nvSpPr>
-          <p:cNvPr id="11" name="Author and Date"/>
+          <p:cNvPr id="11" name="Body Level One…"/>
           <p:cNvSpPr txBox="1"/>
           <p:nvPr>
-            <p:ph type="body" sz="quarter" idx="21" hasCustomPrompt="1"/>
+            <p:ph type="body" sz="quarter" idx="1" hasCustomPrompt="1"/>
           </p:nvPr>
         </p:nvSpPr>
         <p:spPr>
           <a:xfrm>
             <a:off x="1201340" y="11859862"/>
-            <a:ext cx="21971003" cy="636979"/>
+            <a:ext cx="21971004" cy="636980"/>
           </a:xfrm>
           <a:prstGeom prst="rect">
             <a:avLst/>
           </a:prstGeom>
         </p:spPr>
         <p:txBody>
-          <a:bodyPr lIns="45719" tIns="45719" rIns="45719" bIns="45719"/>
+          <a:bodyPr lIns="45718" tIns="45718" rIns="45718" bIns="45718" numCol="1" spcCol="38100"/>
           <a:lstStyle>
             <a:lvl1pPr marL="0" indent="0" defTabSz="825500">
               <a:lnSpc>
@@ -544,11 +550,71 @@
               <a:buNone/>
               <a:defRPr b="1" sz="3600"/>
             </a:lvl1pPr>
+            <a:lvl2pPr marL="1066800" indent="-457200" defTabSz="825500">
+              <a:lnSpc>
+                <a:spcPct val="100000"/>
+              </a:lnSpc>
+              <a:spcBef>
+                <a:spcPts val="0"/>
+              </a:spcBef>
+              <a:defRPr b="1" sz="3600"/>
+            </a:lvl2pPr>
+            <a:lvl3pPr marL="1676400" indent="-457200" defTabSz="825500">
+              <a:lnSpc>
+                <a:spcPct val="100000"/>
+              </a:lnSpc>
+              <a:spcBef>
+                <a:spcPts val="0"/>
+              </a:spcBef>
+              <a:defRPr b="1" sz="3600"/>
+            </a:lvl3pPr>
+            <a:lvl4pPr marL="2286000" indent="-457200" defTabSz="825500">
+              <a:lnSpc>
+                <a:spcPct val="100000"/>
+              </a:lnSpc>
+              <a:spcBef>
+                <a:spcPts val="0"/>
+              </a:spcBef>
+              <a:defRPr b="1" sz="3600"/>
+            </a:lvl4pPr>
+            <a:lvl5pPr marL="2895600" indent="-457200" defTabSz="825500">
+              <a:lnSpc>
+                <a:spcPct val="100000"/>
+              </a:lnSpc>
+              <a:spcBef>
+                <a:spcPts val="0"/>
+              </a:spcBef>
+              <a:defRPr b="1" sz="3600"/>
+            </a:lvl5pPr>
           </a:lstStyle>
           <a:p>
             <a:pPr/>
             <a:r>
               <a:t>Author and Date</a:t>
+            </a:r>
+          </a:p>
+          <a:p>
+            <a:pPr lvl="1"/>
+            <a:r>
+              <a:t/>
+            </a:r>
+          </a:p>
+          <a:p>
+            <a:pPr lvl="2"/>
+            <a:r>
+              <a:t/>
+            </a:r>
+          </a:p>
+          <a:p>
+            <a:pPr lvl="3"/>
+            <a:r>
+              <a:t/>
+            </a:r>
+          </a:p>
+          <a:p>
+            <a:pPr lvl="4"/>
+            <a:r>
+              <a:t/>
             </a:r>
           </a:p>
         </p:txBody>
@@ -564,7 +630,7 @@
         <p:spPr>
           <a:xfrm>
             <a:off x="1206496" y="2574991"/>
-            <a:ext cx="21971004" cy="4648201"/>
+            <a:ext cx="21971005" cy="4648202"/>
           </a:xfrm>
           <a:prstGeom prst="rect">
             <a:avLst/>
@@ -590,20 +656,20 @@
           <p:cNvPr id="13" name="Body Level One…"/>
           <p:cNvSpPr txBox="1"/>
           <p:nvPr>
-            <p:ph type="body" sz="quarter" idx="1" hasCustomPrompt="1"/>
+            <p:ph type="body" sz="quarter" idx="21" hasCustomPrompt="1"/>
           </p:nvPr>
         </p:nvSpPr>
         <p:spPr>
           <a:xfrm>
             <a:off x="1201342" y="7223190"/>
-            <a:ext cx="21971001" cy="1905001"/>
+            <a:ext cx="21971002" cy="1905002"/>
           </a:xfrm>
           <a:prstGeom prst="rect">
             <a:avLst/>
           </a:prstGeom>
         </p:spPr>
         <p:txBody>
-          <a:bodyPr/>
+          <a:bodyPr numCol="1" spcCol="38100"/>
           <a:lstStyle>
             <a:lvl1pPr marL="0" indent="0" defTabSz="825500">
               <a:lnSpc>
@@ -616,79 +682,11 @@
               <a:buNone/>
               <a:defRPr b="1" sz="5500"/>
             </a:lvl1pPr>
-            <a:lvl2pPr marL="0" indent="457200" defTabSz="825500">
-              <a:lnSpc>
-                <a:spcPct val="100000"/>
-              </a:lnSpc>
-              <a:spcBef>
-                <a:spcPts val="0"/>
-              </a:spcBef>
-              <a:buSzTx/>
-              <a:buNone/>
-              <a:defRPr b="1" sz="5500"/>
-            </a:lvl2pPr>
-            <a:lvl3pPr marL="0" indent="914400" defTabSz="825500">
-              <a:lnSpc>
-                <a:spcPct val="100000"/>
-              </a:lnSpc>
-              <a:spcBef>
-                <a:spcPts val="0"/>
-              </a:spcBef>
-              <a:buSzTx/>
-              <a:buNone/>
-              <a:defRPr b="1" sz="5500"/>
-            </a:lvl3pPr>
-            <a:lvl4pPr marL="0" indent="1371600" defTabSz="825500">
-              <a:lnSpc>
-                <a:spcPct val="100000"/>
-              </a:lnSpc>
-              <a:spcBef>
-                <a:spcPts val="0"/>
-              </a:spcBef>
-              <a:buSzTx/>
-              <a:buNone/>
-              <a:defRPr b="1" sz="5500"/>
-            </a:lvl4pPr>
-            <a:lvl5pPr marL="0" indent="1828800" defTabSz="825500">
-              <a:lnSpc>
-                <a:spcPct val="100000"/>
-              </a:lnSpc>
-              <a:spcBef>
-                <a:spcPts val="0"/>
-              </a:spcBef>
-              <a:buSzTx/>
-              <a:buNone/>
-              <a:defRPr b="1" sz="5500"/>
-            </a:lvl5pPr>
           </a:lstStyle>
           <a:p>
             <a:pPr/>
             <a:r>
               <a:t>Presentation Subtitle</a:t>
-            </a:r>
-          </a:p>
-          <a:p>
-            <a:pPr lvl="1"/>
-            <a:r>
-              <a:t/>
-            </a:r>
-          </a:p>
-          <a:p>
-            <a:pPr lvl="2"/>
-            <a:r>
-              <a:t/>
-            </a:r>
-          </a:p>
-          <a:p>
-            <a:pPr lvl="3"/>
-            <a:r>
-              <a:t/>
-            </a:r>
-          </a:p>
-          <a:p>
-            <a:pPr lvl="4"/>
-            <a:r>
-              <a:t/>
             </a:r>
           </a:p>
         </p:txBody>
@@ -759,7 +757,7 @@
           </a:prstGeom>
         </p:spPr>
         <p:txBody>
-          <a:bodyPr anchor="ctr"/>
+          <a:bodyPr numCol="1" spcCol="38100" anchor="ctr"/>
           <a:lstStyle>
             <a:lvl1pPr marL="0" indent="0" algn="ctr">
               <a:lnSpc>
@@ -777,7 +775,7 @@
                 <a:sym typeface="Helvetica Neue Medium"/>
               </a:defRPr>
             </a:lvl1pPr>
-            <a:lvl2pPr marL="0" indent="457200" algn="ctr">
+            <a:lvl2pPr marL="0" indent="0" algn="ctr">
               <a:lnSpc>
                 <a:spcPct val="80000"/>
               </a:lnSpc>
@@ -793,7 +791,7 @@
                 <a:sym typeface="Helvetica Neue Medium"/>
               </a:defRPr>
             </a:lvl2pPr>
-            <a:lvl3pPr marL="0" indent="914400" algn="ctr">
+            <a:lvl3pPr marL="0" indent="0" algn="ctr">
               <a:lnSpc>
                 <a:spcPct val="80000"/>
               </a:lnSpc>
@@ -809,7 +807,7 @@
                 <a:sym typeface="Helvetica Neue Medium"/>
               </a:defRPr>
             </a:lvl3pPr>
-            <a:lvl4pPr marL="0" indent="1371600" algn="ctr">
+            <a:lvl4pPr marL="0" indent="0" algn="ctr">
               <a:lnSpc>
                 <a:spcPct val="80000"/>
               </a:lnSpc>
@@ -825,7 +823,7 @@
                 <a:sym typeface="Helvetica Neue Medium"/>
               </a:defRPr>
             </a:lvl4pPr>
-            <a:lvl5pPr marL="0" indent="1828800" algn="ctr">
+            <a:lvl5pPr marL="0" indent="0" algn="ctr">
               <a:lnSpc>
                 <a:spcPct val="80000"/>
               </a:lnSpc>
@@ -932,15 +930,15 @@
         </p:nvSpPr>
         <p:spPr>
           <a:xfrm>
-            <a:off x="1206500" y="1075927"/>
-            <a:ext cx="21971000" cy="7241584"/>
+            <a:off x="1206500" y="1075926"/>
+            <a:ext cx="21971000" cy="7241586"/>
           </a:xfrm>
           <a:prstGeom prst="rect">
             <a:avLst/>
           </a:prstGeom>
         </p:spPr>
         <p:txBody>
-          <a:bodyPr anchor="b"/>
+          <a:bodyPr numCol="1" spcCol="38100" anchor="b"/>
           <a:lstStyle>
             <a:lvl1pPr marL="0" indent="0" algn="ctr">
               <a:lnSpc>
@@ -953,7 +951,7 @@
               <a:buNone/>
               <a:defRPr b="1" spc="-250" sz="25000"/>
             </a:lvl1pPr>
-            <a:lvl2pPr marL="0" indent="457200" algn="ctr">
+            <a:lvl2pPr marL="0" indent="0" algn="ctr">
               <a:lnSpc>
                 <a:spcPct val="80000"/>
               </a:lnSpc>
@@ -964,7 +962,7 @@
               <a:buNone/>
               <a:defRPr b="1" spc="-250" sz="25000"/>
             </a:lvl2pPr>
-            <a:lvl3pPr marL="0" indent="914400" algn="ctr">
+            <a:lvl3pPr marL="0" indent="0" algn="ctr">
               <a:lnSpc>
                 <a:spcPct val="80000"/>
               </a:lnSpc>
@@ -975,7 +973,7 @@
               <a:buNone/>
               <a:defRPr b="1" spc="-250" sz="25000"/>
             </a:lvl3pPr>
-            <a:lvl4pPr marL="0" indent="1371600" algn="ctr">
+            <a:lvl4pPr marL="0" indent="0" algn="ctr">
               <a:lnSpc>
                 <a:spcPct val="80000"/>
               </a:lnSpc>
@@ -986,7 +984,7 @@
               <a:buNone/>
               <a:defRPr b="1" spc="-250" sz="25000"/>
             </a:lvl4pPr>
-            <a:lvl5pPr marL="0" indent="1828800" algn="ctr">
+            <a:lvl5pPr marL="0" indent="0" algn="ctr">
               <a:lnSpc>
                 <a:spcPct val="80000"/>
               </a:lnSpc>
@@ -1048,7 +1046,7 @@
           </a:prstGeom>
         </p:spPr>
         <p:txBody>
-          <a:bodyPr lIns="45719" tIns="45719" rIns="45719" bIns="45719"/>
+          <a:bodyPr lIns="45718" tIns="45718" rIns="45718" bIns="45718" numCol="1" spcCol="38100"/>
           <a:lstStyle>
             <a:lvl1pPr marL="0" indent="0" algn="ctr" defTabSz="825500">
               <a:lnSpc>
@@ -1120,23 +1118,23 @@
       </p:grpSpPr>
       <p:sp>
         <p:nvSpPr>
-          <p:cNvPr id="115" name="Attribution"/>
+          <p:cNvPr id="115" name="Body Level One…"/>
           <p:cNvSpPr txBox="1"/>
           <p:nvPr>
-            <p:ph type="body" sz="quarter" idx="21" hasCustomPrompt="1"/>
+            <p:ph type="body" sz="quarter" idx="1" hasCustomPrompt="1"/>
           </p:nvPr>
         </p:nvSpPr>
         <p:spPr>
           <a:xfrm>
-            <a:off x="2430025" y="10675453"/>
-            <a:ext cx="20200052" cy="636979"/>
+            <a:off x="2430024" y="10675453"/>
+            <a:ext cx="20200054" cy="636980"/>
           </a:xfrm>
           <a:prstGeom prst="rect">
             <a:avLst/>
           </a:prstGeom>
         </p:spPr>
         <p:txBody>
-          <a:bodyPr lIns="45719" tIns="45719" rIns="45719" bIns="45719"/>
+          <a:bodyPr lIns="45718" tIns="45718" rIns="45718" bIns="45718" numCol="1" spcCol="38100"/>
           <a:lstStyle>
             <a:lvl1pPr marL="0" indent="0" defTabSz="825500">
               <a:lnSpc>
@@ -1149,11 +1147,71 @@
               <a:buNone/>
               <a:defRPr b="1" sz="3600"/>
             </a:lvl1pPr>
+            <a:lvl2pPr marL="1066800" indent="-457200" defTabSz="825500">
+              <a:lnSpc>
+                <a:spcPct val="100000"/>
+              </a:lnSpc>
+              <a:spcBef>
+                <a:spcPts val="0"/>
+              </a:spcBef>
+              <a:defRPr b="1" sz="3600"/>
+            </a:lvl2pPr>
+            <a:lvl3pPr marL="1676400" indent="-457200" defTabSz="825500">
+              <a:lnSpc>
+                <a:spcPct val="100000"/>
+              </a:lnSpc>
+              <a:spcBef>
+                <a:spcPts val="0"/>
+              </a:spcBef>
+              <a:defRPr b="1" sz="3600"/>
+            </a:lvl3pPr>
+            <a:lvl4pPr marL="2286000" indent="-457200" defTabSz="825500">
+              <a:lnSpc>
+                <a:spcPct val="100000"/>
+              </a:lnSpc>
+              <a:spcBef>
+                <a:spcPts val="0"/>
+              </a:spcBef>
+              <a:defRPr b="1" sz="3600"/>
+            </a:lvl4pPr>
+            <a:lvl5pPr marL="2895600" indent="-457200" defTabSz="825500">
+              <a:lnSpc>
+                <a:spcPct val="100000"/>
+              </a:lnSpc>
+              <a:spcBef>
+                <a:spcPts val="0"/>
+              </a:spcBef>
+              <a:defRPr b="1" sz="3600"/>
+            </a:lvl5pPr>
           </a:lstStyle>
           <a:p>
             <a:pPr/>
             <a:r>
               <a:t>Attribution</a:t>
+            </a:r>
+          </a:p>
+          <a:p>
+            <a:pPr lvl="1"/>
+            <a:r>
+              <a:t/>
+            </a:r>
+          </a:p>
+          <a:p>
+            <a:pPr lvl="2"/>
+            <a:r>
+              <a:t/>
+            </a:r>
+          </a:p>
+          <a:p>
+            <a:pPr lvl="3"/>
+            <a:r>
+              <a:t/>
+            </a:r>
+          </a:p>
+          <a:p>
+            <a:pPr lvl="4"/>
+            <a:r>
+              <a:t/>
             </a:r>
           </a:p>
         </p:txBody>
@@ -1163,115 +1221,39 @@
           <p:cNvPr id="116" name="Body Level One…"/>
           <p:cNvSpPr txBox="1"/>
           <p:nvPr>
-            <p:ph type="body" sz="half" idx="1" hasCustomPrompt="1"/>
+            <p:ph type="body" sz="half" idx="21" hasCustomPrompt="1"/>
           </p:nvPr>
         </p:nvSpPr>
         <p:spPr>
           <a:xfrm>
             <a:off x="1753923" y="4939860"/>
-            <a:ext cx="20876154" cy="3836280"/>
+            <a:ext cx="20876154" cy="3836281"/>
           </a:xfrm>
           <a:prstGeom prst="rect">
             <a:avLst/>
           </a:prstGeom>
         </p:spPr>
         <p:txBody>
-          <a:bodyPr/>
+          <a:bodyPr numCol="1" spcCol="38100"/>
           <a:lstStyle>
-            <a:lvl1pPr marL="638923" indent="-469900">
+            <a:lvl1pPr marL="469900" indent="-300876">
               <a:spcBef>
                 <a:spcPts val="0"/>
               </a:spcBef>
               <a:buSzTx/>
               <a:buNone/>
-              <a:defRPr spc="-170" sz="8500">
+              <a:defRPr spc="-200" sz="8500">
                 <a:latin typeface="Helvetica Neue Medium"/>
                 <a:ea typeface="Helvetica Neue Medium"/>
                 <a:cs typeface="Helvetica Neue Medium"/>
                 <a:sym typeface="Helvetica Neue Medium"/>
               </a:defRPr>
             </a:lvl1pPr>
-            <a:lvl2pPr marL="638923" indent="-12700">
-              <a:spcBef>
-                <a:spcPts val="0"/>
-              </a:spcBef>
-              <a:buSzTx/>
-              <a:buNone/>
-              <a:defRPr spc="-170" sz="8500">
-                <a:latin typeface="Helvetica Neue Medium"/>
-                <a:ea typeface="Helvetica Neue Medium"/>
-                <a:cs typeface="Helvetica Neue Medium"/>
-                <a:sym typeface="Helvetica Neue Medium"/>
-              </a:defRPr>
-            </a:lvl2pPr>
-            <a:lvl3pPr marL="638923" indent="444500">
-              <a:spcBef>
-                <a:spcPts val="0"/>
-              </a:spcBef>
-              <a:buSzTx/>
-              <a:buNone/>
-              <a:defRPr spc="-170" sz="8500">
-                <a:latin typeface="Helvetica Neue Medium"/>
-                <a:ea typeface="Helvetica Neue Medium"/>
-                <a:cs typeface="Helvetica Neue Medium"/>
-                <a:sym typeface="Helvetica Neue Medium"/>
-              </a:defRPr>
-            </a:lvl3pPr>
-            <a:lvl4pPr marL="638923" indent="901700">
-              <a:spcBef>
-                <a:spcPts val="0"/>
-              </a:spcBef>
-              <a:buSzTx/>
-              <a:buNone/>
-              <a:defRPr spc="-170" sz="8500">
-                <a:latin typeface="Helvetica Neue Medium"/>
-                <a:ea typeface="Helvetica Neue Medium"/>
-                <a:cs typeface="Helvetica Neue Medium"/>
-                <a:sym typeface="Helvetica Neue Medium"/>
-              </a:defRPr>
-            </a:lvl4pPr>
-            <a:lvl5pPr marL="638923" indent="1358900">
-              <a:spcBef>
-                <a:spcPts val="0"/>
-              </a:spcBef>
-              <a:buSzTx/>
-              <a:buNone/>
-              <a:defRPr spc="-170" sz="8500">
-                <a:latin typeface="Helvetica Neue Medium"/>
-                <a:ea typeface="Helvetica Neue Medium"/>
-                <a:cs typeface="Helvetica Neue Medium"/>
-                <a:sym typeface="Helvetica Neue Medium"/>
-              </a:defRPr>
-            </a:lvl5pPr>
           </a:lstStyle>
           <a:p>
             <a:pPr/>
             <a:r>
               <a:t>“Notable Quote”</a:t>
-            </a:r>
-          </a:p>
-          <a:p>
-            <a:pPr lvl="1"/>
-            <a:r>
-              <a:t/>
-            </a:r>
-          </a:p>
-          <a:p>
-            <a:pPr lvl="2"/>
-            <a:r>
-              <a:t/>
-            </a:r>
-          </a:p>
-          <a:p>
-            <a:pPr lvl="3"/>
-            <a:r>
-              <a:t/>
-            </a:r>
-          </a:p>
-          <a:p>
-            <a:pPr lvl="4"/>
-            <a:r>
-              <a:t/>
             </a:r>
           </a:p>
         </p:txBody>
@@ -1342,7 +1324,7 @@
           </a:prstGeom>
         </p:spPr>
         <p:txBody>
-          <a:bodyPr lIns="91439" tIns="45719" rIns="91439" bIns="45719">
+          <a:bodyPr lIns="91439" tIns="45719" rIns="91439" bIns="45719" numCol="1" spcCol="38100">
             <a:noAutofit/>
           </a:bodyPr>
           <a:lstStyle/>
@@ -1369,7 +1351,7 @@
           </a:prstGeom>
         </p:spPr>
         <p:txBody>
-          <a:bodyPr lIns="91439" tIns="45719" rIns="91439" bIns="45719">
+          <a:bodyPr lIns="91439" tIns="45719" rIns="91439" bIns="45719" numCol="1" spcCol="38100">
             <a:noAutofit/>
           </a:bodyPr>
           <a:lstStyle/>
@@ -1396,7 +1378,7 @@
           </a:prstGeom>
         </p:spPr>
         <p:txBody>
-          <a:bodyPr lIns="91439" tIns="45719" rIns="91439" bIns="45719">
+          <a:bodyPr lIns="91439" tIns="45719" rIns="91439" bIns="45719" numCol="1" spcCol="38100">
             <a:noAutofit/>
           </a:bodyPr>
           <a:lstStyle/>
@@ -1471,7 +1453,7 @@
           </a:prstGeom>
         </p:spPr>
         <p:txBody>
-          <a:bodyPr lIns="91439" tIns="45719" rIns="91439" bIns="45719">
+          <a:bodyPr lIns="91439" tIns="45719" rIns="91439" bIns="45719" numCol="1" spcCol="38100">
             <a:noAutofit/>
           </a:bodyPr>
           <a:lstStyle/>
@@ -1602,7 +1584,7 @@
           </a:prstGeom>
         </p:spPr>
         <p:txBody>
-          <a:bodyPr lIns="91439" tIns="45719" rIns="91439" bIns="45719">
+          <a:bodyPr lIns="91439" tIns="45719" rIns="91439" bIns="45719" numCol="1" spcCol="38100">
             <a:noAutofit/>
           </a:bodyPr>
           <a:lstStyle/>
@@ -1645,23 +1627,23 @@
       </p:sp>
       <p:sp>
         <p:nvSpPr>
-          <p:cNvPr id="23" name="Author and Date"/>
+          <p:cNvPr id="23" name="Body Level One…"/>
           <p:cNvSpPr txBox="1"/>
           <p:nvPr>
-            <p:ph type="body" sz="quarter" idx="22" hasCustomPrompt="1"/>
+            <p:ph type="body" sz="quarter" idx="1" hasCustomPrompt="1"/>
           </p:nvPr>
         </p:nvSpPr>
         <p:spPr>
           <a:xfrm>
             <a:off x="1207690" y="1106137"/>
-            <a:ext cx="21968621" cy="636979"/>
+            <a:ext cx="21968621" cy="636980"/>
           </a:xfrm>
           <a:prstGeom prst="rect">
             <a:avLst/>
           </a:prstGeom>
         </p:spPr>
         <p:txBody>
-          <a:bodyPr lIns="45719" tIns="45719" rIns="45719" bIns="45719"/>
+          <a:bodyPr lIns="45718" tIns="45718" rIns="45718" bIns="45718" numCol="1" spcCol="38100"/>
           <a:lstStyle>
             <a:lvl1pPr marL="0" indent="0" defTabSz="825500">
               <a:lnSpc>
@@ -1674,11 +1656,71 @@
               <a:buNone/>
               <a:defRPr b="1" sz="3600"/>
             </a:lvl1pPr>
+            <a:lvl2pPr marL="1066800" indent="-457200" defTabSz="825500">
+              <a:lnSpc>
+                <a:spcPct val="100000"/>
+              </a:lnSpc>
+              <a:spcBef>
+                <a:spcPts val="0"/>
+              </a:spcBef>
+              <a:defRPr b="1" sz="3600"/>
+            </a:lvl2pPr>
+            <a:lvl3pPr marL="1676400" indent="-457200" defTabSz="825500">
+              <a:lnSpc>
+                <a:spcPct val="100000"/>
+              </a:lnSpc>
+              <a:spcBef>
+                <a:spcPts val="0"/>
+              </a:spcBef>
+              <a:defRPr b="1" sz="3600"/>
+            </a:lvl3pPr>
+            <a:lvl4pPr marL="2286000" indent="-457200" defTabSz="825500">
+              <a:lnSpc>
+                <a:spcPct val="100000"/>
+              </a:lnSpc>
+              <a:spcBef>
+                <a:spcPts val="0"/>
+              </a:spcBef>
+              <a:defRPr b="1" sz="3600"/>
+            </a:lvl4pPr>
+            <a:lvl5pPr marL="2895600" indent="-457200" defTabSz="825500">
+              <a:lnSpc>
+                <a:spcPct val="100000"/>
+              </a:lnSpc>
+              <a:spcBef>
+                <a:spcPts val="0"/>
+              </a:spcBef>
+              <a:defRPr b="1" sz="3600"/>
+            </a:lvl5pPr>
           </a:lstStyle>
           <a:p>
             <a:pPr/>
             <a:r>
               <a:t>Author and Date</a:t>
+            </a:r>
+          </a:p>
+          <a:p>
+            <a:pPr lvl="1"/>
+            <a:r>
+              <a:t/>
+            </a:r>
+          </a:p>
+          <a:p>
+            <a:pPr lvl="2"/>
+            <a:r>
+              <a:t/>
+            </a:r>
+          </a:p>
+          <a:p>
+            <a:pPr lvl="3"/>
+            <a:r>
+              <a:t/>
+            </a:r>
+          </a:p>
+          <a:p>
+            <a:pPr lvl="4"/>
+            <a:r>
+              <a:t/>
             </a:r>
           </a:p>
         </p:txBody>
@@ -1688,20 +1730,20 @@
           <p:cNvPr id="24" name="Body Level One…"/>
           <p:cNvSpPr txBox="1"/>
           <p:nvPr>
-            <p:ph type="body" sz="quarter" idx="1" hasCustomPrompt="1"/>
+            <p:ph type="body" sz="quarter" idx="22" hasCustomPrompt="1"/>
           </p:nvPr>
         </p:nvSpPr>
         <p:spPr>
           <a:xfrm>
-            <a:off x="1206500" y="11609910"/>
-            <a:ext cx="21971000" cy="1116952"/>
+            <a:off x="1206500" y="11609909"/>
+            <a:ext cx="21971000" cy="1116953"/>
           </a:xfrm>
           <a:prstGeom prst="rect">
             <a:avLst/>
           </a:prstGeom>
         </p:spPr>
         <p:txBody>
-          <a:bodyPr/>
+          <a:bodyPr numCol="1" spcCol="38100"/>
           <a:lstStyle>
             <a:lvl1pPr marL="0" indent="0" defTabSz="825500">
               <a:lnSpc>
@@ -1714,79 +1756,11 @@
               <a:buNone/>
               <a:defRPr b="1" sz="5500"/>
             </a:lvl1pPr>
-            <a:lvl2pPr marL="0" indent="457200" defTabSz="825500">
-              <a:lnSpc>
-                <a:spcPct val="100000"/>
-              </a:lnSpc>
-              <a:spcBef>
-                <a:spcPts val="0"/>
-              </a:spcBef>
-              <a:buSzTx/>
-              <a:buNone/>
-              <a:defRPr b="1" sz="5500"/>
-            </a:lvl2pPr>
-            <a:lvl3pPr marL="0" indent="914400" defTabSz="825500">
-              <a:lnSpc>
-                <a:spcPct val="100000"/>
-              </a:lnSpc>
-              <a:spcBef>
-                <a:spcPts val="0"/>
-              </a:spcBef>
-              <a:buSzTx/>
-              <a:buNone/>
-              <a:defRPr b="1" sz="5500"/>
-            </a:lvl3pPr>
-            <a:lvl4pPr marL="0" indent="1371600" defTabSz="825500">
-              <a:lnSpc>
-                <a:spcPct val="100000"/>
-              </a:lnSpc>
-              <a:spcBef>
-                <a:spcPts val="0"/>
-              </a:spcBef>
-              <a:buSzTx/>
-              <a:buNone/>
-              <a:defRPr b="1" sz="5500"/>
-            </a:lvl4pPr>
-            <a:lvl5pPr marL="0" indent="1828800" defTabSz="825500">
-              <a:lnSpc>
-                <a:spcPct val="100000"/>
-              </a:lnSpc>
-              <a:spcBef>
-                <a:spcPts val="0"/>
-              </a:spcBef>
-              <a:buSzTx/>
-              <a:buNone/>
-              <a:defRPr b="1" sz="5500"/>
-            </a:lvl5pPr>
           </a:lstStyle>
           <a:p>
             <a:pPr/>
             <a:r>
               <a:t>Presentation Subtitle</a:t>
-            </a:r>
-          </a:p>
-          <a:p>
-            <a:pPr lvl="1"/>
-            <a:r>
-              <a:t/>
-            </a:r>
-          </a:p>
-          <a:p>
-            <a:pPr lvl="2"/>
-            <a:r>
-              <a:t/>
-            </a:r>
-          </a:p>
-          <a:p>
-            <a:pPr lvl="3"/>
-            <a:r>
-              <a:t/>
-            </a:r>
-          </a:p>
-          <a:p>
-            <a:pPr lvl="4"/>
-            <a:r>
-              <a:t/>
             </a:r>
           </a:p>
         </p:txBody>
@@ -1857,7 +1831,7 @@
           </a:prstGeom>
         </p:spPr>
         <p:txBody>
-          <a:bodyPr lIns="91439" tIns="45719" rIns="91439" bIns="45719">
+          <a:bodyPr lIns="91439" tIns="45719" rIns="91439" bIns="45719" numCol="1" spcCol="38100">
             <a:noAutofit/>
           </a:bodyPr>
           <a:lstStyle/>
@@ -1877,7 +1851,7 @@
         <p:spPr>
           <a:xfrm>
             <a:off x="1206500" y="1270000"/>
-            <a:ext cx="9779000" cy="5882273"/>
+            <a:ext cx="9779000" cy="5882274"/>
           </a:xfrm>
           <a:prstGeom prst="rect">
             <a:avLst/>
@@ -1912,7 +1886,7 @@
           </a:prstGeom>
         </p:spPr>
         <p:txBody>
-          <a:bodyPr/>
+          <a:bodyPr numCol="1" spcCol="38100"/>
           <a:lstStyle>
             <a:lvl1pPr marL="0" indent="0" defTabSz="825500">
               <a:lnSpc>
@@ -1925,7 +1899,7 @@
               <a:buNone/>
               <a:defRPr b="1" sz="5500"/>
             </a:lvl1pPr>
-            <a:lvl2pPr marL="0" indent="457200" defTabSz="825500">
+            <a:lvl2pPr marL="0" indent="0" defTabSz="825500">
               <a:lnSpc>
                 <a:spcPct val="100000"/>
               </a:lnSpc>
@@ -1936,7 +1910,7 @@
               <a:buNone/>
               <a:defRPr b="1" sz="5500"/>
             </a:lvl2pPr>
-            <a:lvl3pPr marL="0" indent="914400" defTabSz="825500">
+            <a:lvl3pPr marL="0" indent="0" defTabSz="825500">
               <a:lnSpc>
                 <a:spcPct val="100000"/>
               </a:lnSpc>
@@ -1947,7 +1921,7 @@
               <a:buNone/>
               <a:defRPr b="1" sz="5500"/>
             </a:lvl3pPr>
-            <a:lvl4pPr marL="0" indent="1371600" defTabSz="825500">
+            <a:lvl4pPr marL="0" indent="0" defTabSz="825500">
               <a:lnSpc>
                 <a:spcPct val="100000"/>
               </a:lnSpc>
@@ -1958,7 +1932,7 @@
               <a:buNone/>
               <a:defRPr b="1" sz="5500"/>
             </a:lvl4pPr>
-            <a:lvl5pPr marL="0" indent="1828800" defTabSz="825500">
+            <a:lvl5pPr marL="0" indent="0" defTabSz="825500">
               <a:lnSpc>
                 <a:spcPct val="100000"/>
               </a:lnSpc>
@@ -2063,6 +2037,10 @@
           </p:nvPr>
         </p:nvSpPr>
         <p:spPr>
+          <a:xfrm>
+            <a:off x="1206500" y="1079500"/>
+            <a:ext cx="21971000" cy="1433164"/>
+          </a:xfrm>
           <a:prstGeom prst="rect">
             <a:avLst/>
           </a:prstGeom>
@@ -2080,23 +2058,23 @@
       </p:sp>
       <p:sp>
         <p:nvSpPr>
-          <p:cNvPr id="43" name="Slide Subtitle"/>
+          <p:cNvPr id="43" name="Body Level One…"/>
           <p:cNvSpPr txBox="1"/>
           <p:nvPr>
-            <p:ph type="body" sz="quarter" idx="21" hasCustomPrompt="1"/>
+            <p:ph type="body" sz="quarter" idx="1" hasCustomPrompt="1"/>
           </p:nvPr>
         </p:nvSpPr>
         <p:spPr>
           <a:xfrm>
-            <a:off x="1206500" y="2372962"/>
-            <a:ext cx="21971000" cy="934780"/>
+            <a:off x="1206500" y="2372961"/>
+            <a:ext cx="21971000" cy="934781"/>
           </a:xfrm>
           <a:prstGeom prst="rect">
             <a:avLst/>
           </a:prstGeom>
         </p:spPr>
         <p:txBody>
-          <a:bodyPr lIns="45719" tIns="45719" rIns="45719" bIns="45719"/>
+          <a:bodyPr lIns="45718" tIns="45718" rIns="45718" bIns="45718" numCol="1" spcCol="38100"/>
           <a:lstStyle>
             <a:lvl1pPr marL="0" indent="0" defTabSz="825500">
               <a:lnSpc>
@@ -2109,11 +2087,71 @@
               <a:buNone/>
               <a:defRPr b="1" sz="5500"/>
             </a:lvl1pPr>
+            <a:lvl2pPr marL="1308100" indent="-698500" defTabSz="825500">
+              <a:lnSpc>
+                <a:spcPct val="100000"/>
+              </a:lnSpc>
+              <a:spcBef>
+                <a:spcPts val="0"/>
+              </a:spcBef>
+              <a:defRPr b="1" sz="5500"/>
+            </a:lvl2pPr>
+            <a:lvl3pPr marL="1917700" indent="-698500" defTabSz="825500">
+              <a:lnSpc>
+                <a:spcPct val="100000"/>
+              </a:lnSpc>
+              <a:spcBef>
+                <a:spcPts val="0"/>
+              </a:spcBef>
+              <a:defRPr b="1" sz="5500"/>
+            </a:lvl3pPr>
+            <a:lvl4pPr marL="2527300" indent="-698500" defTabSz="825500">
+              <a:lnSpc>
+                <a:spcPct val="100000"/>
+              </a:lnSpc>
+              <a:spcBef>
+                <a:spcPts val="0"/>
+              </a:spcBef>
+              <a:defRPr b="1" sz="5500"/>
+            </a:lvl4pPr>
+            <a:lvl5pPr marL="3136900" indent="-698500" defTabSz="825500">
+              <a:lnSpc>
+                <a:spcPct val="100000"/>
+              </a:lnSpc>
+              <a:spcBef>
+                <a:spcPts val="0"/>
+              </a:spcBef>
+              <a:defRPr b="1" sz="5500"/>
+            </a:lvl5pPr>
           </a:lstStyle>
           <a:p>
             <a:pPr/>
             <a:r>
               <a:t>Slide Subtitle</a:t>
+            </a:r>
+          </a:p>
+          <a:p>
+            <a:pPr lvl="1"/>
+            <a:r>
+              <a:t/>
+            </a:r>
+          </a:p>
+          <a:p>
+            <a:pPr lvl="2"/>
+            <a:r>
+              <a:t/>
+            </a:r>
+          </a:p>
+          <a:p>
+            <a:pPr lvl="3"/>
+            <a:r>
+              <a:t/>
+            </a:r>
+          </a:p>
+          <a:p>
+            <a:pPr lvl="4"/>
+            <a:r>
+              <a:t/>
             </a:r>
           </a:p>
         </p:txBody>
@@ -2123,45 +2161,21 @@
           <p:cNvPr id="44" name="Body Level One…"/>
           <p:cNvSpPr txBox="1"/>
           <p:nvPr>
-            <p:ph type="body" idx="1" hasCustomPrompt="1"/>
-          </p:nvPr>
-        </p:nvSpPr>
-        <p:spPr>
-          <a:prstGeom prst="rect">
-            <a:avLst/>
-          </a:prstGeom>
-        </p:spPr>
-        <p:txBody>
-          <a:bodyPr/>
+            <p:ph type="body" idx="21" hasCustomPrompt="1"/>
+          </p:nvPr>
+        </p:nvSpPr>
+        <p:spPr>
+          <a:prstGeom prst="rect">
+            <a:avLst/>
+          </a:prstGeom>
+        </p:spPr>
+        <p:txBody>
+          <a:bodyPr numCol="1" spcCol="38100"/>
           <a:lstStyle/>
           <a:p>
             <a:pPr/>
             <a:r>
               <a:t>Slide bullet text</a:t>
-            </a:r>
-          </a:p>
-          <a:p>
-            <a:pPr lvl="1"/>
-            <a:r>
-              <a:t/>
-            </a:r>
-          </a:p>
-          <a:p>
-            <a:pPr lvl="2"/>
-            <a:r>
-              <a:t/>
-            </a:r>
-          </a:p>
-          <a:p>
-            <a:pPr lvl="3"/>
-            <a:r>
-              <a:t/>
-            </a:r>
-          </a:p>
-          <a:p>
-            <a:pPr lvl="4"/>
-            <a:r>
-              <a:t/>
             </a:r>
           </a:p>
         </p:txBody>
@@ -2228,7 +2242,7 @@
           </a:prstGeom>
         </p:spPr>
         <p:txBody>
-          <a:bodyPr numCol="2" spcCol="1098550"/>
+          <a:bodyPr/>
           <a:lstStyle/>
           <a:p>
             <a:pPr/>
@@ -2312,23 +2326,23 @@
       </p:grpSpPr>
       <p:sp>
         <p:nvSpPr>
-          <p:cNvPr id="60" name="Slide Subtitle"/>
+          <p:cNvPr id="60" name="Body Level One…"/>
           <p:cNvSpPr txBox="1"/>
           <p:nvPr>
-            <p:ph type="body" sz="quarter" idx="21" hasCustomPrompt="1"/>
+            <p:ph type="body" sz="quarter" idx="1" hasCustomPrompt="1"/>
           </p:nvPr>
         </p:nvSpPr>
         <p:spPr>
           <a:xfrm>
-            <a:off x="1206500" y="2372962"/>
-            <a:ext cx="9779000" cy="934780"/>
+            <a:off x="1206500" y="2372961"/>
+            <a:ext cx="9779000" cy="934781"/>
           </a:xfrm>
           <a:prstGeom prst="rect">
             <a:avLst/>
           </a:prstGeom>
         </p:spPr>
         <p:txBody>
-          <a:bodyPr lIns="45719" tIns="45719" rIns="45719" bIns="45719"/>
+          <a:bodyPr lIns="45718" tIns="45718" rIns="45718" bIns="45718" numCol="1" spcCol="38100"/>
           <a:lstStyle>
             <a:lvl1pPr marL="0" indent="0" defTabSz="825500">
               <a:lnSpc>
@@ -2341,11 +2355,71 @@
               <a:buNone/>
               <a:defRPr b="1" sz="5500"/>
             </a:lvl1pPr>
+            <a:lvl2pPr marL="1308100" indent="-698500" defTabSz="825500">
+              <a:lnSpc>
+                <a:spcPct val="100000"/>
+              </a:lnSpc>
+              <a:spcBef>
+                <a:spcPts val="0"/>
+              </a:spcBef>
+              <a:defRPr b="1" sz="5500"/>
+            </a:lvl2pPr>
+            <a:lvl3pPr marL="1917700" indent="-698500" defTabSz="825500">
+              <a:lnSpc>
+                <a:spcPct val="100000"/>
+              </a:lnSpc>
+              <a:spcBef>
+                <a:spcPts val="0"/>
+              </a:spcBef>
+              <a:defRPr b="1" sz="5500"/>
+            </a:lvl3pPr>
+            <a:lvl4pPr marL="2527300" indent="-698500" defTabSz="825500">
+              <a:lnSpc>
+                <a:spcPct val="100000"/>
+              </a:lnSpc>
+              <a:spcBef>
+                <a:spcPts val="0"/>
+              </a:spcBef>
+              <a:defRPr b="1" sz="5500"/>
+            </a:lvl4pPr>
+            <a:lvl5pPr marL="3136900" indent="-698500" defTabSz="825500">
+              <a:lnSpc>
+                <a:spcPct val="100000"/>
+              </a:lnSpc>
+              <a:spcBef>
+                <a:spcPts val="0"/>
+              </a:spcBef>
+              <a:defRPr b="1" sz="5500"/>
+            </a:lvl5pPr>
           </a:lstStyle>
           <a:p>
             <a:pPr/>
             <a:r>
               <a:t>Slide Subtitle</a:t>
+            </a:r>
+          </a:p>
+          <a:p>
+            <a:pPr lvl="1"/>
+            <a:r>
+              <a:t/>
+            </a:r>
+          </a:p>
+          <a:p>
+            <a:pPr lvl="2"/>
+            <a:r>
+              <a:t/>
+            </a:r>
+          </a:p>
+          <a:p>
+            <a:pPr lvl="3"/>
+            <a:r>
+              <a:t/>
+            </a:r>
+          </a:p>
+          <a:p>
+            <a:pPr lvl="4"/>
+            <a:r>
+              <a:t/>
             </a:r>
           </a:p>
         </p:txBody>
@@ -2355,49 +2429,25 @@
           <p:cNvPr id="61" name="Body Level One…"/>
           <p:cNvSpPr txBox="1"/>
           <p:nvPr>
-            <p:ph type="body" sz="half" idx="1" hasCustomPrompt="1"/>
+            <p:ph type="body" sz="half" idx="21" hasCustomPrompt="1"/>
           </p:nvPr>
         </p:nvSpPr>
         <p:spPr>
           <a:xfrm>
-            <a:off x="1206500" y="4248504"/>
-            <a:ext cx="9779000" cy="8256630"/>
+            <a:off x="1206500" y="4248503"/>
+            <a:ext cx="9779000" cy="8256631"/>
           </a:xfrm>
           <a:prstGeom prst="rect">
             <a:avLst/>
           </a:prstGeom>
         </p:spPr>
         <p:txBody>
-          <a:bodyPr/>
+          <a:bodyPr numCol="1" spcCol="38100"/>
           <a:lstStyle/>
           <a:p>
             <a:pPr/>
             <a:r>
               <a:t>Slide bullet text</a:t>
-            </a:r>
-          </a:p>
-          <a:p>
-            <a:pPr lvl="1"/>
-            <a:r>
-              <a:t/>
-            </a:r>
-          </a:p>
-          <a:p>
-            <a:pPr lvl="2"/>
-            <a:r>
-              <a:t/>
-            </a:r>
-          </a:p>
-          <a:p>
-            <a:pPr lvl="3"/>
-            <a:r>
-              <a:t/>
-            </a:r>
-          </a:p>
-          <a:p>
-            <a:pPr lvl="4"/>
-            <a:r>
-              <a:t/>
             </a:r>
           </a:p>
         </p:txBody>
@@ -2413,14 +2463,14 @@
         <p:spPr>
           <a:xfrm>
             <a:off x="12192000" y="-407266"/>
-            <a:ext cx="10916874" cy="14555832"/>
+            <a:ext cx="10916874" cy="14555833"/>
           </a:xfrm>
           <a:prstGeom prst="rect">
             <a:avLst/>
           </a:prstGeom>
         </p:spPr>
         <p:txBody>
-          <a:bodyPr lIns="91439" tIns="45719" rIns="91439" bIns="45719">
+          <a:bodyPr lIns="91439" tIns="45719" rIns="91439" bIns="45719" numCol="1" spcCol="38100">
             <a:noAutofit/>
           </a:bodyPr>
           <a:lstStyle/>
@@ -2516,7 +2566,7 @@
         <p:spPr>
           <a:xfrm>
             <a:off x="1206496" y="4533900"/>
-            <a:ext cx="21971004" cy="4648200"/>
+            <a:ext cx="21971005" cy="4648200"/>
           </a:xfrm>
           <a:prstGeom prst="rect">
             <a:avLst/>
@@ -2605,7 +2655,7 @@
         <p:spPr>
           <a:xfrm>
             <a:off x="1206500" y="1079500"/>
-            <a:ext cx="21971000" cy="1434949"/>
+            <a:ext cx="21971000" cy="1434950"/>
           </a:xfrm>
           <a:prstGeom prst="rect">
             <a:avLst/>
@@ -2624,23 +2674,23 @@
       </p:sp>
       <p:sp>
         <p:nvSpPr>
-          <p:cNvPr id="80" name="Slide Subtitle"/>
+          <p:cNvPr id="80" name="Body Level One…"/>
           <p:cNvSpPr txBox="1"/>
           <p:nvPr>
-            <p:ph type="body" sz="quarter" idx="21" hasCustomPrompt="1"/>
+            <p:ph type="body" sz="quarter" idx="1" hasCustomPrompt="1"/>
           </p:nvPr>
         </p:nvSpPr>
         <p:spPr>
           <a:xfrm>
-            <a:off x="1206500" y="2372962"/>
-            <a:ext cx="21971000" cy="934780"/>
+            <a:off x="1206500" y="2372961"/>
+            <a:ext cx="21971000" cy="934781"/>
           </a:xfrm>
           <a:prstGeom prst="rect">
             <a:avLst/>
           </a:prstGeom>
         </p:spPr>
         <p:txBody>
-          <a:bodyPr lIns="45719" tIns="45719" rIns="45719" bIns="45719"/>
+          <a:bodyPr lIns="45718" tIns="45718" rIns="45718" bIns="45718" numCol="1" spcCol="38100"/>
           <a:lstStyle>
             <a:lvl1pPr marL="0" indent="0" defTabSz="825500">
               <a:lnSpc>
@@ -2653,11 +2703,71 @@
               <a:buNone/>
               <a:defRPr b="1" sz="5500"/>
             </a:lvl1pPr>
+            <a:lvl2pPr marL="1308100" indent="-698500" defTabSz="825500">
+              <a:lnSpc>
+                <a:spcPct val="100000"/>
+              </a:lnSpc>
+              <a:spcBef>
+                <a:spcPts val="0"/>
+              </a:spcBef>
+              <a:defRPr b="1" sz="5500"/>
+            </a:lvl2pPr>
+            <a:lvl3pPr marL="1917700" indent="-698500" defTabSz="825500">
+              <a:lnSpc>
+                <a:spcPct val="100000"/>
+              </a:lnSpc>
+              <a:spcBef>
+                <a:spcPts val="0"/>
+              </a:spcBef>
+              <a:defRPr b="1" sz="5500"/>
+            </a:lvl3pPr>
+            <a:lvl4pPr marL="2527300" indent="-698500" defTabSz="825500">
+              <a:lnSpc>
+                <a:spcPct val="100000"/>
+              </a:lnSpc>
+              <a:spcBef>
+                <a:spcPts val="0"/>
+              </a:spcBef>
+              <a:defRPr b="1" sz="5500"/>
+            </a:lvl4pPr>
+            <a:lvl5pPr marL="3136900" indent="-698500" defTabSz="825500">
+              <a:lnSpc>
+                <a:spcPct val="100000"/>
+              </a:lnSpc>
+              <a:spcBef>
+                <a:spcPts val="0"/>
+              </a:spcBef>
+              <a:defRPr b="1" sz="5500"/>
+            </a:lvl5pPr>
           </a:lstStyle>
           <a:p>
             <a:pPr/>
             <a:r>
               <a:t>Slide Subtitle</a:t>
+            </a:r>
+          </a:p>
+          <a:p>
+            <a:pPr lvl="1"/>
+            <a:r>
+              <a:t/>
+            </a:r>
+          </a:p>
+          <a:p>
+            <a:pPr lvl="2"/>
+            <a:r>
+              <a:t/>
+            </a:r>
+          </a:p>
+          <a:p>
+            <a:pPr lvl="3"/>
+            <a:r>
+              <a:t/>
+            </a:r>
+          </a:p>
+          <a:p>
+            <a:pPr lvl="4"/>
+            <a:r>
+              <a:t/>
             </a:r>
           </a:p>
         </p:txBody>
@@ -2740,23 +2850,23 @@
       </p:sp>
       <p:sp>
         <p:nvSpPr>
-          <p:cNvPr id="89" name="Agenda Subtitle"/>
+          <p:cNvPr id="89" name="Body Level One…"/>
           <p:cNvSpPr txBox="1"/>
           <p:nvPr>
-            <p:ph type="body" sz="quarter" idx="21" hasCustomPrompt="1"/>
+            <p:ph type="body" sz="quarter" idx="1" hasCustomPrompt="1"/>
           </p:nvPr>
         </p:nvSpPr>
         <p:spPr>
           <a:xfrm>
-            <a:off x="1206500" y="2372962"/>
-            <a:ext cx="21971000" cy="934780"/>
+            <a:off x="1206500" y="2372961"/>
+            <a:ext cx="21971000" cy="934781"/>
           </a:xfrm>
           <a:prstGeom prst="rect">
             <a:avLst/>
           </a:prstGeom>
         </p:spPr>
         <p:txBody>
-          <a:bodyPr lIns="45719" tIns="45719" rIns="45719" bIns="45719"/>
+          <a:bodyPr lIns="45718" tIns="45718" rIns="45718" bIns="45718" numCol="1" spcCol="38100"/>
           <a:lstStyle>
             <a:lvl1pPr marL="0" indent="0" defTabSz="825500">
               <a:lnSpc>
@@ -2769,11 +2879,71 @@
               <a:buNone/>
               <a:defRPr b="1" sz="5500"/>
             </a:lvl1pPr>
+            <a:lvl2pPr marL="1308100" indent="-698500" defTabSz="825500">
+              <a:lnSpc>
+                <a:spcPct val="100000"/>
+              </a:lnSpc>
+              <a:spcBef>
+                <a:spcPts val="0"/>
+              </a:spcBef>
+              <a:defRPr b="1" sz="5500"/>
+            </a:lvl2pPr>
+            <a:lvl3pPr marL="1917700" indent="-698500" defTabSz="825500">
+              <a:lnSpc>
+                <a:spcPct val="100000"/>
+              </a:lnSpc>
+              <a:spcBef>
+                <a:spcPts val="0"/>
+              </a:spcBef>
+              <a:defRPr b="1" sz="5500"/>
+            </a:lvl3pPr>
+            <a:lvl4pPr marL="2527300" indent="-698500" defTabSz="825500">
+              <a:lnSpc>
+                <a:spcPct val="100000"/>
+              </a:lnSpc>
+              <a:spcBef>
+                <a:spcPts val="0"/>
+              </a:spcBef>
+              <a:defRPr b="1" sz="5500"/>
+            </a:lvl4pPr>
+            <a:lvl5pPr marL="3136900" indent="-698500" defTabSz="825500">
+              <a:lnSpc>
+                <a:spcPct val="100000"/>
+              </a:lnSpc>
+              <a:spcBef>
+                <a:spcPts val="0"/>
+              </a:spcBef>
+              <a:defRPr b="1" sz="5500"/>
+            </a:lvl5pPr>
           </a:lstStyle>
           <a:p>
             <a:pPr/>
             <a:r>
               <a:t>Agenda Subtitle</a:t>
+            </a:r>
+          </a:p>
+          <a:p>
+            <a:pPr lvl="1"/>
+            <a:r>
+              <a:t/>
+            </a:r>
+          </a:p>
+          <a:p>
+            <a:pPr lvl="2"/>
+            <a:r>
+              <a:t/>
+            </a:r>
+          </a:p>
+          <a:p>
+            <a:pPr lvl="3"/>
+            <a:r>
+              <a:t/>
+            </a:r>
+          </a:p>
+          <a:p>
+            <a:pPr lvl="4"/>
+            <a:r>
+              <a:t/>
             </a:r>
           </a:p>
         </p:txBody>
@@ -2783,16 +2953,16 @@
           <p:cNvPr id="90" name="Body Level One…"/>
           <p:cNvSpPr txBox="1"/>
           <p:nvPr>
-            <p:ph type="body" idx="1" hasCustomPrompt="1"/>
-          </p:nvPr>
-        </p:nvSpPr>
-        <p:spPr>
-          <a:prstGeom prst="rect">
-            <a:avLst/>
-          </a:prstGeom>
-        </p:spPr>
-        <p:txBody>
-          <a:bodyPr/>
+            <p:ph type="body" idx="21" hasCustomPrompt="1"/>
+          </p:nvPr>
+        </p:nvSpPr>
+        <p:spPr>
+          <a:prstGeom prst="rect">
+            <a:avLst/>
+          </a:prstGeom>
+        </p:spPr>
+        <p:txBody>
+          <a:bodyPr numCol="1" spcCol="38100"/>
           <a:lstStyle>
             <a:lvl1pPr marL="0" indent="0" defTabSz="825500">
               <a:lnSpc>
@@ -2803,81 +2973,13 @@
               </a:spcBef>
               <a:buSzTx/>
               <a:buNone/>
-              <a:defRPr spc="-55" sz="5500"/>
+              <a:defRPr spc="-99" sz="5500"/>
             </a:lvl1pPr>
-            <a:lvl2pPr marL="0" indent="457200" defTabSz="825500">
-              <a:lnSpc>
-                <a:spcPct val="100000"/>
-              </a:lnSpc>
-              <a:spcBef>
-                <a:spcPts val="1800"/>
-              </a:spcBef>
-              <a:buSzTx/>
-              <a:buNone/>
-              <a:defRPr spc="-55" sz="5500"/>
-            </a:lvl2pPr>
-            <a:lvl3pPr marL="0" indent="914400" defTabSz="825500">
-              <a:lnSpc>
-                <a:spcPct val="100000"/>
-              </a:lnSpc>
-              <a:spcBef>
-                <a:spcPts val="1800"/>
-              </a:spcBef>
-              <a:buSzTx/>
-              <a:buNone/>
-              <a:defRPr spc="-55" sz="5500"/>
-            </a:lvl3pPr>
-            <a:lvl4pPr marL="0" indent="1371600" defTabSz="825500">
-              <a:lnSpc>
-                <a:spcPct val="100000"/>
-              </a:lnSpc>
-              <a:spcBef>
-                <a:spcPts val="1800"/>
-              </a:spcBef>
-              <a:buSzTx/>
-              <a:buNone/>
-              <a:defRPr spc="-55" sz="5500"/>
-            </a:lvl4pPr>
-            <a:lvl5pPr marL="0" indent="1828800" defTabSz="825500">
-              <a:lnSpc>
-                <a:spcPct val="100000"/>
-              </a:lnSpc>
-              <a:spcBef>
-                <a:spcPts val="1800"/>
-              </a:spcBef>
-              <a:buSzTx/>
-              <a:buNone/>
-              <a:defRPr spc="-55" sz="5500"/>
-            </a:lvl5pPr>
           </a:lstStyle>
           <a:p>
             <a:pPr/>
             <a:r>
               <a:t>Agenda Topics</a:t>
-            </a:r>
-          </a:p>
-          <a:p>
-            <a:pPr lvl="1"/>
-            <a:r>
-              <a:t/>
-            </a:r>
-          </a:p>
-          <a:p>
-            <a:pPr lvl="2"/>
-            <a:r>
-              <a:t/>
-            </a:r>
-          </a:p>
-          <a:p>
-            <a:pPr lvl="3"/>
-            <a:r>
-              <a:t/>
-            </a:r>
-          </a:p>
-          <a:p>
-            <a:pPr lvl="4"/>
-            <a:r>
-              <a:t/>
             </a:r>
           </a:p>
         </p:txBody>
@@ -2939,16 +3041,16 @@
       </p:grpSpPr>
       <p:sp>
         <p:nvSpPr>
-          <p:cNvPr id="2" name="Slide Title"/>
+          <p:cNvPr id="2" name="Body Level One…"/>
           <p:cNvSpPr txBox="1"/>
           <p:nvPr>
-            <p:ph type="title" hasCustomPrompt="1"/>
+            <p:ph type="body" idx="1" hasCustomPrompt="1"/>
           </p:nvPr>
         </p:nvSpPr>
         <p:spPr>
           <a:xfrm>
-            <a:off x="1206500" y="1079500"/>
-            <a:ext cx="21971000" cy="1433163"/>
+            <a:off x="1206500" y="4248503"/>
+            <a:ext cx="21971000" cy="8256014"/>
           </a:xfrm>
           <a:prstGeom prst="rect">
             <a:avLst/>
@@ -2963,30 +3065,54 @@
           </a:extLst>
         </p:spPr>
         <p:txBody>
-          <a:bodyPr lIns="50800" tIns="50800" rIns="50800" bIns="50800">
+          <a:bodyPr lIns="50800" tIns="50800" rIns="50800" bIns="50800" numCol="2" spcCol="1098550">
             <a:normAutofit fontScale="100000" lnSpcReduction="0"/>
           </a:bodyPr>
           <a:lstStyle/>
           <a:p>
             <a:pPr/>
             <a:r>
-              <a:t>Slide Title</a:t>
-            </a:r>
-          </a:p>
-        </p:txBody>
-      </p:sp>
-      <p:sp>
-        <p:nvSpPr>
-          <p:cNvPr id="3" name="Body Level One…"/>
+              <a:t>Slide bullet text</a:t>
+            </a:r>
+          </a:p>
+          <a:p>
+            <a:pPr lvl="1"/>
+            <a:r>
+              <a:t/>
+            </a:r>
+          </a:p>
+          <a:p>
+            <a:pPr lvl="2"/>
+            <a:r>
+              <a:t/>
+            </a:r>
+          </a:p>
+          <a:p>
+            <a:pPr lvl="3"/>
+            <a:r>
+              <a:t/>
+            </a:r>
+          </a:p>
+          <a:p>
+            <a:pPr lvl="4"/>
+            <a:r>
+              <a:t/>
+            </a:r>
+          </a:p>
+        </p:txBody>
+      </p:sp>
+      <p:sp>
+        <p:nvSpPr>
+          <p:cNvPr id="3" name="Title Text"/>
           <p:cNvSpPr txBox="1"/>
           <p:nvPr>
-            <p:ph type="body" idx="1" hasCustomPrompt="1"/>
+            <p:ph type="title"/>
           </p:nvPr>
         </p:nvSpPr>
         <p:spPr>
           <a:xfrm>
-            <a:off x="1206500" y="4248504"/>
-            <a:ext cx="21971000" cy="8256012"/>
+            <a:off x="3653366" y="2743200"/>
+            <a:ext cx="19507201" cy="1505304"/>
           </a:xfrm>
           <a:prstGeom prst="rect">
             <a:avLst/>
@@ -3008,31 +3134,7 @@
           <a:p>
             <a:pPr/>
             <a:r>
-              <a:t>Slide bullet text</a:t>
-            </a:r>
-          </a:p>
-          <a:p>
-            <a:pPr lvl="1"/>
-            <a:r>
-              <a:t/>
-            </a:r>
-          </a:p>
-          <a:p>
-            <a:pPr lvl="2"/>
-            <a:r>
-              <a:t/>
-            </a:r>
-          </a:p>
-          <a:p>
-            <a:pPr lvl="3"/>
-            <a:r>
-              <a:t/>
-            </a:r>
-          </a:p>
-          <a:p>
-            <a:pPr lvl="4"/>
-            <a:r>
-              <a:t/>
+              <a:t>Title Text</a:t>
             </a:r>
           </a:p>
         </p:txBody>
@@ -3099,7 +3201,7 @@
   <p:transition xmlns:p14="http://schemas.microsoft.com/office/powerpoint/2010/main" spd="med" advClick="1"/>
   <p:txStyles>
     <p:titleStyle>
-      <a:lvl1pPr marL="0" marR="0" indent="0" algn="l" defTabSz="2438338" rtl="0" latinLnBrk="0">
+      <a:lvl1pPr marL="0" marR="0" indent="0" algn="l" defTabSz="2438337" rtl="0" latinLnBrk="0">
         <a:lnSpc>
           <a:spcPct val="80000"/>
         </a:lnSpc>
@@ -3119,13 +3221,13 @@
             <a:srgbClr val="000000"/>
           </a:solidFill>
           <a:uFillTx/>
-          <a:latin typeface="+mn-lt"/>
-          <a:ea typeface="+mn-ea"/>
-          <a:cs typeface="+mn-cs"/>
+          <a:latin typeface="+mj-lt"/>
+          <a:ea typeface="+mj-ea"/>
+          <a:cs typeface="+mj-cs"/>
           <a:sym typeface="Helvetica Neue"/>
         </a:defRPr>
       </a:lvl1pPr>
-      <a:lvl2pPr marL="0" marR="0" indent="457200" algn="l" defTabSz="2438338" rtl="0" latinLnBrk="0">
+      <a:lvl2pPr marL="0" marR="0" indent="0" algn="l" defTabSz="2438337" rtl="0" latinLnBrk="0">
         <a:lnSpc>
           <a:spcPct val="80000"/>
         </a:lnSpc>
@@ -3145,13 +3247,13 @@
             <a:srgbClr val="000000"/>
           </a:solidFill>
           <a:uFillTx/>
-          <a:latin typeface="+mn-lt"/>
-          <a:ea typeface="+mn-ea"/>
-          <a:cs typeface="+mn-cs"/>
+          <a:latin typeface="+mj-lt"/>
+          <a:ea typeface="+mj-ea"/>
+          <a:cs typeface="+mj-cs"/>
           <a:sym typeface="Helvetica Neue"/>
         </a:defRPr>
       </a:lvl2pPr>
-      <a:lvl3pPr marL="0" marR="0" indent="914400" algn="l" defTabSz="2438338" rtl="0" latinLnBrk="0">
+      <a:lvl3pPr marL="0" marR="0" indent="0" algn="l" defTabSz="2438337" rtl="0" latinLnBrk="0">
         <a:lnSpc>
           <a:spcPct val="80000"/>
         </a:lnSpc>
@@ -3171,13 +3273,13 @@
             <a:srgbClr val="000000"/>
           </a:solidFill>
           <a:uFillTx/>
-          <a:latin typeface="+mn-lt"/>
-          <a:ea typeface="+mn-ea"/>
-          <a:cs typeface="+mn-cs"/>
+          <a:latin typeface="+mj-lt"/>
+          <a:ea typeface="+mj-ea"/>
+          <a:cs typeface="+mj-cs"/>
           <a:sym typeface="Helvetica Neue"/>
         </a:defRPr>
       </a:lvl3pPr>
-      <a:lvl4pPr marL="0" marR="0" indent="1371600" algn="l" defTabSz="2438338" rtl="0" latinLnBrk="0">
+      <a:lvl4pPr marL="0" marR="0" indent="0" algn="l" defTabSz="2438337" rtl="0" latinLnBrk="0">
         <a:lnSpc>
           <a:spcPct val="80000"/>
         </a:lnSpc>
@@ -3197,13 +3299,13 @@
             <a:srgbClr val="000000"/>
           </a:solidFill>
           <a:uFillTx/>
-          <a:latin typeface="+mn-lt"/>
-          <a:ea typeface="+mn-ea"/>
-          <a:cs typeface="+mn-cs"/>
+          <a:latin typeface="+mj-lt"/>
+          <a:ea typeface="+mj-ea"/>
+          <a:cs typeface="+mj-cs"/>
           <a:sym typeface="Helvetica Neue"/>
         </a:defRPr>
       </a:lvl4pPr>
-      <a:lvl5pPr marL="0" marR="0" indent="1828800" algn="l" defTabSz="2438338" rtl="0" latinLnBrk="0">
+      <a:lvl5pPr marL="0" marR="0" indent="0" algn="l" defTabSz="2438337" rtl="0" latinLnBrk="0">
         <a:lnSpc>
           <a:spcPct val="80000"/>
         </a:lnSpc>
@@ -3223,13 +3325,13 @@
             <a:srgbClr val="000000"/>
           </a:solidFill>
           <a:uFillTx/>
-          <a:latin typeface="+mn-lt"/>
-          <a:ea typeface="+mn-ea"/>
-          <a:cs typeface="+mn-cs"/>
+          <a:latin typeface="+mj-lt"/>
+          <a:ea typeface="+mj-ea"/>
+          <a:cs typeface="+mj-cs"/>
           <a:sym typeface="Helvetica Neue"/>
         </a:defRPr>
       </a:lvl5pPr>
-      <a:lvl6pPr marL="0" marR="0" indent="2286000" algn="l" defTabSz="2438338" rtl="0" latinLnBrk="0">
+      <a:lvl6pPr marL="0" marR="0" indent="0" algn="l" defTabSz="2438337" rtl="0" latinLnBrk="0">
         <a:lnSpc>
           <a:spcPct val="80000"/>
         </a:lnSpc>
@@ -3249,13 +3351,13 @@
             <a:srgbClr val="000000"/>
           </a:solidFill>
           <a:uFillTx/>
-          <a:latin typeface="+mn-lt"/>
-          <a:ea typeface="+mn-ea"/>
-          <a:cs typeface="+mn-cs"/>
+          <a:latin typeface="+mj-lt"/>
+          <a:ea typeface="+mj-ea"/>
+          <a:cs typeface="+mj-cs"/>
           <a:sym typeface="Helvetica Neue"/>
         </a:defRPr>
       </a:lvl6pPr>
-      <a:lvl7pPr marL="0" marR="0" indent="2743200" algn="l" defTabSz="2438338" rtl="0" latinLnBrk="0">
+      <a:lvl7pPr marL="0" marR="0" indent="0" algn="l" defTabSz="2438337" rtl="0" latinLnBrk="0">
         <a:lnSpc>
           <a:spcPct val="80000"/>
         </a:lnSpc>
@@ -3275,13 +3377,13 @@
             <a:srgbClr val="000000"/>
           </a:solidFill>
           <a:uFillTx/>
-          <a:latin typeface="+mn-lt"/>
-          <a:ea typeface="+mn-ea"/>
-          <a:cs typeface="+mn-cs"/>
+          <a:latin typeface="+mj-lt"/>
+          <a:ea typeface="+mj-ea"/>
+          <a:cs typeface="+mj-cs"/>
           <a:sym typeface="Helvetica Neue"/>
         </a:defRPr>
       </a:lvl7pPr>
-      <a:lvl8pPr marL="0" marR="0" indent="3200400" algn="l" defTabSz="2438338" rtl="0" latinLnBrk="0">
+      <a:lvl8pPr marL="0" marR="0" indent="0" algn="l" defTabSz="2438337" rtl="0" latinLnBrk="0">
         <a:lnSpc>
           <a:spcPct val="80000"/>
         </a:lnSpc>
@@ -3301,13 +3403,13 @@
             <a:srgbClr val="000000"/>
           </a:solidFill>
           <a:uFillTx/>
-          <a:latin typeface="+mn-lt"/>
-          <a:ea typeface="+mn-ea"/>
-          <a:cs typeface="+mn-cs"/>
+          <a:latin typeface="+mj-lt"/>
+          <a:ea typeface="+mj-ea"/>
+          <a:cs typeface="+mj-cs"/>
           <a:sym typeface="Helvetica Neue"/>
         </a:defRPr>
       </a:lvl8pPr>
-      <a:lvl9pPr marL="0" marR="0" indent="3657600" algn="l" defTabSz="2438338" rtl="0" latinLnBrk="0">
+      <a:lvl9pPr marL="0" marR="0" indent="0" algn="l" defTabSz="2438337" rtl="0" latinLnBrk="0">
         <a:lnSpc>
           <a:spcPct val="80000"/>
         </a:lnSpc>
@@ -3327,15 +3429,15 @@
             <a:srgbClr val="000000"/>
           </a:solidFill>
           <a:uFillTx/>
-          <a:latin typeface="+mn-lt"/>
-          <a:ea typeface="+mn-ea"/>
-          <a:cs typeface="+mn-cs"/>
+          <a:latin typeface="+mj-lt"/>
+          <a:ea typeface="+mj-ea"/>
+          <a:cs typeface="+mj-cs"/>
           <a:sym typeface="Helvetica Neue"/>
         </a:defRPr>
       </a:lvl9pPr>
     </p:titleStyle>
     <p:bodyStyle>
-      <a:lvl1pPr marL="609600" marR="0" indent="-609600" algn="l" defTabSz="2438338" rtl="0" latinLnBrk="0">
+      <a:lvl1pPr marL="609600" marR="0" indent="-609600" algn="l" defTabSz="2438337" rtl="0" latinLnBrk="0">
         <a:lnSpc>
           <a:spcPct val="90000"/>
         </a:lnSpc>
@@ -3355,13 +3457,13 @@
             <a:srgbClr val="000000"/>
           </a:solidFill>
           <a:uFillTx/>
-          <a:latin typeface="+mn-lt"/>
-          <a:ea typeface="+mn-ea"/>
-          <a:cs typeface="+mn-cs"/>
+          <a:latin typeface="+mj-lt"/>
+          <a:ea typeface="+mj-ea"/>
+          <a:cs typeface="+mj-cs"/>
           <a:sym typeface="Helvetica Neue"/>
         </a:defRPr>
       </a:lvl1pPr>
-      <a:lvl2pPr marL="1219200" marR="0" indent="-609600" algn="l" defTabSz="2438338" rtl="0" latinLnBrk="0">
+      <a:lvl2pPr marL="1219200" marR="0" indent="-609600" algn="l" defTabSz="2438337" rtl="0" latinLnBrk="0">
         <a:lnSpc>
           <a:spcPct val="90000"/>
         </a:lnSpc>
@@ -3381,13 +3483,13 @@
             <a:srgbClr val="000000"/>
           </a:solidFill>
           <a:uFillTx/>
-          <a:latin typeface="+mn-lt"/>
-          <a:ea typeface="+mn-ea"/>
-          <a:cs typeface="+mn-cs"/>
+          <a:latin typeface="+mj-lt"/>
+          <a:ea typeface="+mj-ea"/>
+          <a:cs typeface="+mj-cs"/>
           <a:sym typeface="Helvetica Neue"/>
         </a:defRPr>
       </a:lvl2pPr>
-      <a:lvl3pPr marL="1828800" marR="0" indent="-609600" algn="l" defTabSz="2438338" rtl="0" latinLnBrk="0">
+      <a:lvl3pPr marL="1828800" marR="0" indent="-609600" algn="l" defTabSz="2438337" rtl="0" latinLnBrk="0">
         <a:lnSpc>
           <a:spcPct val="90000"/>
         </a:lnSpc>
@@ -3407,13 +3509,13 @@
             <a:srgbClr val="000000"/>
           </a:solidFill>
           <a:uFillTx/>
-          <a:latin typeface="+mn-lt"/>
-          <a:ea typeface="+mn-ea"/>
-          <a:cs typeface="+mn-cs"/>
+          <a:latin typeface="+mj-lt"/>
+          <a:ea typeface="+mj-ea"/>
+          <a:cs typeface="+mj-cs"/>
           <a:sym typeface="Helvetica Neue"/>
         </a:defRPr>
       </a:lvl3pPr>
-      <a:lvl4pPr marL="2438400" marR="0" indent="-609600" algn="l" defTabSz="2438338" rtl="0" latinLnBrk="0">
+      <a:lvl4pPr marL="2438400" marR="0" indent="-609600" algn="l" defTabSz="2438337" rtl="0" latinLnBrk="0">
         <a:lnSpc>
           <a:spcPct val="90000"/>
         </a:lnSpc>
@@ -3433,13 +3535,13 @@
             <a:srgbClr val="000000"/>
           </a:solidFill>
           <a:uFillTx/>
-          <a:latin typeface="+mn-lt"/>
-          <a:ea typeface="+mn-ea"/>
-          <a:cs typeface="+mn-cs"/>
+          <a:latin typeface="+mj-lt"/>
+          <a:ea typeface="+mj-ea"/>
+          <a:cs typeface="+mj-cs"/>
           <a:sym typeface="Helvetica Neue"/>
         </a:defRPr>
       </a:lvl4pPr>
-      <a:lvl5pPr marL="3048000" marR="0" indent="-609600" algn="l" defTabSz="2438338" rtl="0" latinLnBrk="0">
+      <a:lvl5pPr marL="3048000" marR="0" indent="-609600" algn="l" defTabSz="2438337" rtl="0" latinLnBrk="0">
         <a:lnSpc>
           <a:spcPct val="90000"/>
         </a:lnSpc>
@@ -3459,13 +3561,13 @@
             <a:srgbClr val="000000"/>
           </a:solidFill>
           <a:uFillTx/>
-          <a:latin typeface="+mn-lt"/>
-          <a:ea typeface="+mn-ea"/>
-          <a:cs typeface="+mn-cs"/>
+          <a:latin typeface="+mj-lt"/>
+          <a:ea typeface="+mj-ea"/>
+          <a:cs typeface="+mj-cs"/>
           <a:sym typeface="Helvetica Neue"/>
         </a:defRPr>
       </a:lvl5pPr>
-      <a:lvl6pPr marL="3657600" marR="0" indent="-609600" algn="l" defTabSz="2438338" rtl="0" latinLnBrk="0">
+      <a:lvl6pPr marL="3657600" marR="0" indent="-609600" algn="l" defTabSz="2438337" rtl="0" latinLnBrk="0">
         <a:lnSpc>
           <a:spcPct val="90000"/>
         </a:lnSpc>
@@ -3485,13 +3587,13 @@
             <a:srgbClr val="000000"/>
           </a:solidFill>
           <a:uFillTx/>
-          <a:latin typeface="+mn-lt"/>
-          <a:ea typeface="+mn-ea"/>
-          <a:cs typeface="+mn-cs"/>
+          <a:latin typeface="+mj-lt"/>
+          <a:ea typeface="+mj-ea"/>
+          <a:cs typeface="+mj-cs"/>
           <a:sym typeface="Helvetica Neue"/>
         </a:defRPr>
       </a:lvl6pPr>
-      <a:lvl7pPr marL="4267200" marR="0" indent="-609600" algn="l" defTabSz="2438338" rtl="0" latinLnBrk="0">
+      <a:lvl7pPr marL="4267200" marR="0" indent="-609600" algn="l" defTabSz="2438337" rtl="0" latinLnBrk="0">
         <a:lnSpc>
           <a:spcPct val="90000"/>
         </a:lnSpc>
@@ -3511,13 +3613,13 @@
             <a:srgbClr val="000000"/>
           </a:solidFill>
           <a:uFillTx/>
-          <a:latin typeface="+mn-lt"/>
-          <a:ea typeface="+mn-ea"/>
-          <a:cs typeface="+mn-cs"/>
+          <a:latin typeface="+mj-lt"/>
+          <a:ea typeface="+mj-ea"/>
+          <a:cs typeface="+mj-cs"/>
           <a:sym typeface="Helvetica Neue"/>
         </a:defRPr>
       </a:lvl7pPr>
-      <a:lvl8pPr marL="4876800" marR="0" indent="-609600" algn="l" defTabSz="2438338" rtl="0" latinLnBrk="0">
+      <a:lvl8pPr marL="4876800" marR="0" indent="-609600" algn="l" defTabSz="2438337" rtl="0" latinLnBrk="0">
         <a:lnSpc>
           <a:spcPct val="90000"/>
         </a:lnSpc>
@@ -3537,13 +3639,13 @@
             <a:srgbClr val="000000"/>
           </a:solidFill>
           <a:uFillTx/>
-          <a:latin typeface="+mn-lt"/>
-          <a:ea typeface="+mn-ea"/>
-          <a:cs typeface="+mn-cs"/>
+          <a:latin typeface="+mj-lt"/>
+          <a:ea typeface="+mj-ea"/>
+          <a:cs typeface="+mj-cs"/>
           <a:sym typeface="Helvetica Neue"/>
         </a:defRPr>
       </a:lvl8pPr>
-      <a:lvl9pPr marL="5486400" marR="0" indent="-609600" algn="l" defTabSz="2438338" rtl="0" latinLnBrk="0">
+      <a:lvl9pPr marL="5486400" marR="0" indent="-609600" algn="l" defTabSz="2438337" rtl="0" latinLnBrk="0">
         <a:lnSpc>
           <a:spcPct val="90000"/>
         </a:lnSpc>
@@ -3563,9 +3665,9 @@
             <a:srgbClr val="000000"/>
           </a:solidFill>
           <a:uFillTx/>
-          <a:latin typeface="+mn-lt"/>
-          <a:ea typeface="+mn-ea"/>
-          <a:cs typeface="+mn-cs"/>
+          <a:latin typeface="+mj-lt"/>
+          <a:ea typeface="+mj-ea"/>
+          <a:cs typeface="+mj-cs"/>
           <a:sym typeface="Helvetica Neue"/>
         </a:defRPr>
       </a:lvl9pPr>
@@ -3597,7 +3699,7 @@
           <a:sym typeface="Helvetica Neue"/>
         </a:defRPr>
       </a:lvl1pPr>
-      <a:lvl2pPr marL="0" marR="0" indent="457200" algn="ctr" defTabSz="584200" rtl="0" latinLnBrk="0">
+      <a:lvl2pPr marL="0" marR="0" indent="0" algn="ctr" defTabSz="584200" rtl="0" latinLnBrk="0">
         <a:lnSpc>
           <a:spcPct val="100000"/>
         </a:lnSpc>
@@ -3623,7 +3725,7 @@
           <a:sym typeface="Helvetica Neue"/>
         </a:defRPr>
       </a:lvl2pPr>
-      <a:lvl3pPr marL="0" marR="0" indent="914400" algn="ctr" defTabSz="584200" rtl="0" latinLnBrk="0">
+      <a:lvl3pPr marL="0" marR="0" indent="0" algn="ctr" defTabSz="584200" rtl="0" latinLnBrk="0">
         <a:lnSpc>
           <a:spcPct val="100000"/>
         </a:lnSpc>
@@ -3649,7 +3751,7 @@
           <a:sym typeface="Helvetica Neue"/>
         </a:defRPr>
       </a:lvl3pPr>
-      <a:lvl4pPr marL="0" marR="0" indent="1371600" algn="ctr" defTabSz="584200" rtl="0" latinLnBrk="0">
+      <a:lvl4pPr marL="0" marR="0" indent="0" algn="ctr" defTabSz="584200" rtl="0" latinLnBrk="0">
         <a:lnSpc>
           <a:spcPct val="100000"/>
         </a:lnSpc>
@@ -3675,7 +3777,7 @@
           <a:sym typeface="Helvetica Neue"/>
         </a:defRPr>
       </a:lvl4pPr>
-      <a:lvl5pPr marL="0" marR="0" indent="1828800" algn="ctr" defTabSz="584200" rtl="0" latinLnBrk="0">
+      <a:lvl5pPr marL="0" marR="0" indent="0" algn="ctr" defTabSz="584200" rtl="0" latinLnBrk="0">
         <a:lnSpc>
           <a:spcPct val="100000"/>
         </a:lnSpc>
@@ -3701,7 +3803,7 @@
           <a:sym typeface="Helvetica Neue"/>
         </a:defRPr>
       </a:lvl5pPr>
-      <a:lvl6pPr marL="0" marR="0" indent="2286000" algn="ctr" defTabSz="584200" rtl="0" latinLnBrk="0">
+      <a:lvl6pPr marL="0" marR="0" indent="0" algn="ctr" defTabSz="584200" rtl="0" latinLnBrk="0">
         <a:lnSpc>
           <a:spcPct val="100000"/>
         </a:lnSpc>
@@ -3727,7 +3829,7 @@
           <a:sym typeface="Helvetica Neue"/>
         </a:defRPr>
       </a:lvl6pPr>
-      <a:lvl7pPr marL="0" marR="0" indent="2743200" algn="ctr" defTabSz="584200" rtl="0" latinLnBrk="0">
+      <a:lvl7pPr marL="0" marR="0" indent="0" algn="ctr" defTabSz="584200" rtl="0" latinLnBrk="0">
         <a:lnSpc>
           <a:spcPct val="100000"/>
         </a:lnSpc>
@@ -3753,7 +3855,7 @@
           <a:sym typeface="Helvetica Neue"/>
         </a:defRPr>
       </a:lvl7pPr>
-      <a:lvl8pPr marL="0" marR="0" indent="3200400" algn="ctr" defTabSz="584200" rtl="0" latinLnBrk="0">
+      <a:lvl8pPr marL="0" marR="0" indent="0" algn="ctr" defTabSz="584200" rtl="0" latinLnBrk="0">
         <a:lnSpc>
           <a:spcPct val="100000"/>
         </a:lnSpc>
@@ -3779,7 +3881,7 @@
           <a:sym typeface="Helvetica Neue"/>
         </a:defRPr>
       </a:lvl8pPr>
-      <a:lvl9pPr marL="0" marR="0" indent="3657600" algn="ctr" defTabSz="584200" rtl="0" latinLnBrk="0">
+      <a:lvl9pPr marL="0" marR="0" indent="0" algn="ctr" defTabSz="584200" rtl="0" latinLnBrk="0">
         <a:lnSpc>
           <a:spcPct val="100000"/>
         </a:lnSpc>
@@ -3832,13 +3934,78 @@
           <p:cNvPr id="151" name="Anar Sultani, Daniel Grimm, Gayrat Rakhimov, Zhang Yinghong, Suchith Shetty"/>
           <p:cNvSpPr txBox="1"/>
           <p:nvPr>
-            <p:ph type="body" idx="21"/>
-          </p:nvPr>
-        </p:nvSpPr>
-        <p:spPr>
-          <a:prstGeom prst="rect">
-            <a:avLst/>
-          </a:prstGeom>
+            <p:ph type="body" sz="quarter" idx="1"/>
+          </p:nvPr>
+        </p:nvSpPr>
+        <p:spPr>
+          <a:xfrm>
+            <a:off x="1201341" y="11859862"/>
+            <a:ext cx="21971002" cy="636980"/>
+          </a:xfrm>
+          <a:prstGeom prst="rect">
+            <a:avLst/>
+          </a:prstGeom>
+        </p:spPr>
+        <p:txBody>
+          <a:bodyPr/>
+          <a:lstStyle/>
+          <a:p>
+            <a:pPr/>
+            <a:r>
+              <a:t>Daniel Grimm, Gayrat Rakhimov, Suchith Shetty</a:t>
+            </a:r>
+          </a:p>
+        </p:txBody>
+      </p:sp>
+      <p:sp>
+        <p:nvSpPr>
+          <p:cNvPr id="152" name="Anomaly detection on financial data"/>
+          <p:cNvSpPr txBox="1"/>
+          <p:nvPr>
+            <p:ph type="title"/>
+          </p:nvPr>
+        </p:nvSpPr>
+        <p:spPr>
+          <a:xfrm>
+            <a:off x="1206495" y="2574991"/>
+            <a:ext cx="21971006" cy="4648202"/>
+          </a:xfrm>
+          <a:prstGeom prst="rect">
+            <a:avLst/>
+          </a:prstGeom>
+        </p:spPr>
+        <p:txBody>
+          <a:bodyPr/>
+          <a:lstStyle>
+            <a:lvl1pPr>
+              <a:defRPr spc="-300"/>
+            </a:lvl1pPr>
+          </a:lstStyle>
+          <a:p>
+            <a:pPr/>
+            <a:r>
+              <a:t>Anomaly detection on financial data</a:t>
+            </a:r>
+          </a:p>
+        </p:txBody>
+      </p:sp>
+      <p:sp>
+        <p:nvSpPr>
+          <p:cNvPr id="153" name="SM and OST project"/>
+          <p:cNvSpPr txBox="1"/>
+          <p:nvPr/>
+        </p:nvSpPr>
+        <p:spPr>
+          <a:xfrm>
+            <a:off x="1201342" y="7223190"/>
+            <a:ext cx="21971002" cy="1905002"/>
+          </a:xfrm>
+          <a:prstGeom prst="rect">
+            <a:avLst/>
+          </a:prstGeom>
+          <a:ln w="12700">
+            <a:miter lim="400000"/>
+          </a:ln>
           <a:extLst>
             <a:ext uri="{C572A759-6A51-4108-AA02-DFA0A04FC94B}">
               <ma14:wrappingTextBoxFlag xmlns:ma14="http://schemas.microsoft.com/office/mac/drawingml/2011/main" val="1"/>
@@ -3846,49 +4013,275 @@
           </a:extLst>
         </p:spPr>
         <p:txBody>
+          <a:bodyPr lIns="50800" tIns="50800" rIns="50800" bIns="50800">
+            <a:normAutofit fontScale="100000" lnSpcReduction="0"/>
+          </a:bodyPr>
+          <a:lstStyle>
+            <a:lvl1pPr algn="l" defTabSz="825500">
+              <a:defRPr b="1" sz="5500">
+                <a:solidFill>
+                  <a:srgbClr val="000000"/>
+                </a:solidFill>
+              </a:defRPr>
+            </a:lvl1pPr>
+          </a:lstStyle>
+          <a:p>
+            <a:pPr/>
+            <a:r>
+              <a:t>SM and OST project</a:t>
+            </a:r>
+          </a:p>
+        </p:txBody>
+      </p:sp>
+    </p:spTree>
+  </p:cSld>
+  <p:clrMapOvr>
+    <a:masterClrMapping/>
+  </p:clrMapOvr>
+  <p:transition xmlns:p14="http://schemas.microsoft.com/office/powerpoint/2010/main" spd="med" advClick="1"/>
+</p:sld>
+</file>
+
+<file path=ppt/slides/slide10.xml><?xml version="1.0" encoding="utf-8"?>
+<p:sld xmlns:a="http://schemas.openxmlformats.org/drawingml/2006/main" xmlns:r="http://schemas.openxmlformats.org/officeDocument/2006/relationships" xmlns:p="http://schemas.openxmlformats.org/presentationml/2006/main" xmlns:m="http://schemas.openxmlformats.org/officeDocument/2006/math" xmlns:a14="http://schemas.microsoft.com/office/drawing/2010/main" showMasterSp="1" showMasterPhAnim="1">
+  <p:cSld>
+    <p:spTree>
+      <p:nvGrpSpPr>
+        <p:cNvPr id="1" name=""/>
+        <p:cNvGrpSpPr/>
+        <p:nvPr/>
+      </p:nvGrpSpPr>
+      <p:grpSpPr>
+        <a:xfrm>
+          <a:off x="0" y="0"/>
+          <a:ext cx="0" cy="0"/>
+          <a:chOff x="0" y="0"/>
+          <a:chExt cx="0" cy="0"/>
+        </a:xfrm>
+      </p:grpSpPr>
+      <p:sp>
+        <p:nvSpPr>
+          <p:cNvPr id="192" name="Contributions"/>
+          <p:cNvSpPr txBox="1"/>
+          <p:nvPr>
+            <p:ph type="title"/>
+          </p:nvPr>
+        </p:nvSpPr>
+        <p:spPr>
+          <a:prstGeom prst="rect">
+            <a:avLst/>
+          </a:prstGeom>
+        </p:spPr>
+        <p:txBody>
+          <a:bodyPr/>
+          <a:lstStyle>
+            <a:lvl1pPr>
+              <a:defRPr spc="-200"/>
+            </a:lvl1pPr>
+          </a:lstStyle>
+          <a:p>
+            <a:pPr/>
+            <a:r>
+              <a:t>Contributions</a:t>
+            </a:r>
+          </a:p>
+        </p:txBody>
+      </p:sp>
+      <p:sp>
+        <p:nvSpPr>
+          <p:cNvPr id="193" name="Daniel Grimm - BU44BJ"/>
+          <p:cNvSpPr txBox="1"/>
+          <p:nvPr>
+            <p:ph type="body" sz="quarter" idx="1"/>
+          </p:nvPr>
+        </p:nvSpPr>
+        <p:spPr>
+          <a:xfrm>
+            <a:off x="1206500" y="2372961"/>
+            <a:ext cx="21971000" cy="934780"/>
+          </a:xfrm>
+          <a:prstGeom prst="rect">
+            <a:avLst/>
+          </a:prstGeom>
+        </p:spPr>
+        <p:txBody>
           <a:bodyPr/>
           <a:lstStyle/>
           <a:p>
             <a:pPr/>
             <a:r>
-              <a:t>Anar Sultani, Daniel Grimm, Gayrat Rakhimov, Zhang Yinghong, Suchith Shetty</a:t>
-            </a:r>
-          </a:p>
-        </p:txBody>
-      </p:sp>
-      <p:sp>
-        <p:nvSpPr>
-          <p:cNvPr id="152" name="Anomaly detection on financial data"/>
+              <a:t>Daniel Grimm - BU44BJ</a:t>
+            </a:r>
+          </a:p>
+        </p:txBody>
+      </p:sp>
+      <p:sp>
+        <p:nvSpPr>
+          <p:cNvPr id="194" name="Configuring and setting up Docker containers for Elasticsearch and Kibana…"/>
           <p:cNvSpPr txBox="1"/>
           <p:nvPr>
-            <p:ph type="ctrTitle"/>
-          </p:nvPr>
-        </p:nvSpPr>
-        <p:spPr>
-          <a:prstGeom prst="rect">
-            <a:avLst/>
-          </a:prstGeom>
+            <p:ph type="body" idx="21"/>
+          </p:nvPr>
+        </p:nvSpPr>
+        <p:spPr>
+          <a:prstGeom prst="rect">
+            <a:avLst/>
+          </a:prstGeom>
+          <a:extLst>
+            <a:ext uri="{C572A759-6A51-4108-AA02-DFA0A04FC94B}">
+              <ma14:wrappingTextBoxFlag xmlns:ma14="http://schemas.microsoft.com/office/mac/drawingml/2011/main" val="1"/>
+            </a:ext>
+          </a:extLst>
         </p:spPr>
         <p:txBody>
           <a:bodyPr/>
           <a:lstStyle/>
           <a:p>
-            <a:pPr/>
-            <a:r>
-              <a:t>Anomaly detection on financial data</a:t>
-            </a:r>
-          </a:p>
-        </p:txBody>
-      </p:sp>
-      <p:sp>
-        <p:nvSpPr>
-          <p:cNvPr id="153" name="SM and OST project"/>
+            <a:pPr marL="573023" indent="-573023" defTabSz="2292038">
+              <a:spcBef>
+                <a:spcPts val="4200"/>
+              </a:spcBef>
+              <a:defRPr sz="4500"/>
+            </a:pPr>
+            <a:r>
+              <a:t>    Configuring and setting up Docker containers for Elasticsearch and Kibana</a:t>
+            </a:r>
+          </a:p>
+          <a:p>
+            <a:pPr marL="573023" indent="-573023" defTabSz="2292038">
+              <a:spcBef>
+                <a:spcPts val="4200"/>
+              </a:spcBef>
+              <a:defRPr sz="4500"/>
+            </a:pPr>
+            <a:r>
+              <a:t>    Connecting pipeline: local installation + docker</a:t>
+            </a:r>
+          </a:p>
+          <a:p>
+            <a:pPr marL="573023" indent="-573023" defTabSz="2292038">
+              <a:spcBef>
+                <a:spcPts val="4200"/>
+              </a:spcBef>
+              <a:defRPr sz="4500"/>
+            </a:pPr>
+            <a:r>
+              <a:t>    Parsing data from balance.csv</a:t>
+            </a:r>
+          </a:p>
+          <a:p>
+            <a:pPr marL="573023" indent="-573023" defTabSz="2292038">
+              <a:spcBef>
+                <a:spcPts val="4200"/>
+              </a:spcBef>
+              <a:defRPr sz="4500"/>
+            </a:pPr>
+            <a:r>
+              <a:t>    Creating multiple anomaly detector functions</a:t>
+            </a:r>
+          </a:p>
+          <a:p>
+            <a:pPr marL="573023" indent="-573023" defTabSz="2292038">
+              <a:spcBef>
+                <a:spcPts val="4200"/>
+              </a:spcBef>
+              <a:defRPr sz="4500"/>
+            </a:pPr>
+            <a:r>
+              <a:t>    Creating kibana visualizations</a:t>
+            </a:r>
+          </a:p>
+          <a:p>
+            <a:pPr marL="573023" indent="-573023" defTabSz="2292038">
+              <a:spcBef>
+                <a:spcPts val="4200"/>
+              </a:spcBef>
+              <a:defRPr sz="4500"/>
+            </a:pPr>
+            <a:r>
+              <a:t>    Code  repository  management  on  Github: reviewing and creating pull requests</a:t>
+            </a:r>
+          </a:p>
+          <a:p>
+            <a:pPr marL="573023" indent="-573023" defTabSz="2292038">
+              <a:spcBef>
+                <a:spcPts val="4200"/>
+              </a:spcBef>
+              <a:defRPr sz="4500"/>
+            </a:pPr>
+            <a:r>
+              <a:t>    Participating in project team’s meetings</a:t>
+            </a:r>
+          </a:p>
+        </p:txBody>
+      </p:sp>
+    </p:spTree>
+  </p:cSld>
+  <p:clrMapOvr>
+    <a:masterClrMapping/>
+  </p:clrMapOvr>
+  <p:transition xmlns:p14="http://schemas.microsoft.com/office/powerpoint/2010/main" spd="med" advClick="1"/>
+</p:sld>
+</file>
+
+<file path=ppt/slides/slide11.xml><?xml version="1.0" encoding="utf-8"?>
+<p:sld xmlns:a="http://schemas.openxmlformats.org/drawingml/2006/main" xmlns:r="http://schemas.openxmlformats.org/officeDocument/2006/relationships" xmlns:p="http://schemas.openxmlformats.org/presentationml/2006/main" xmlns:m="http://schemas.openxmlformats.org/officeDocument/2006/math" xmlns:a14="http://schemas.microsoft.com/office/drawing/2010/main" showMasterSp="1" showMasterPhAnim="1">
+  <p:cSld>
+    <p:spTree>
+      <p:nvGrpSpPr>
+        <p:cNvPr id="1" name=""/>
+        <p:cNvGrpSpPr/>
+        <p:nvPr/>
+      </p:nvGrpSpPr>
+      <p:grpSpPr>
+        <a:xfrm>
+          <a:off x="0" y="0"/>
+          <a:ext cx="0" cy="0"/>
+          <a:chOff x="0" y="0"/>
+          <a:chExt cx="0" cy="0"/>
+        </a:xfrm>
+      </p:grpSpPr>
+      <p:sp>
+        <p:nvSpPr>
+          <p:cNvPr id="196" name="Contributions"/>
           <p:cNvSpPr txBox="1"/>
           <p:nvPr>
-            <p:ph type="subTitle" sz="quarter" idx="1"/>
-          </p:nvPr>
-        </p:nvSpPr>
-        <p:spPr>
+            <p:ph type="title"/>
+          </p:nvPr>
+        </p:nvSpPr>
+        <p:spPr>
+          <a:prstGeom prst="rect">
+            <a:avLst/>
+          </a:prstGeom>
+        </p:spPr>
+        <p:txBody>
+          <a:bodyPr/>
+          <a:lstStyle>
+            <a:lvl1pPr>
+              <a:defRPr spc="-200"/>
+            </a:lvl1pPr>
+          </a:lstStyle>
+          <a:p>
+            <a:pPr/>
+            <a:r>
+              <a:t>Contributions</a:t>
+            </a:r>
+          </a:p>
+        </p:txBody>
+      </p:sp>
+      <p:sp>
+        <p:nvSpPr>
+          <p:cNvPr id="197" name="Suchith Shetty - HIUH69"/>
+          <p:cNvSpPr txBox="1"/>
+          <p:nvPr>
+            <p:ph type="body" sz="quarter" idx="1"/>
+          </p:nvPr>
+        </p:nvSpPr>
+        <p:spPr>
+          <a:xfrm>
+            <a:off x="1206500" y="2372961"/>
+            <a:ext cx="21971000" cy="934780"/>
+          </a:xfrm>
           <a:prstGeom prst="rect">
             <a:avLst/>
           </a:prstGeom>
@@ -3899,7 +4292,161 @@
           <a:p>
             <a:pPr/>
             <a:r>
-              <a:t>SM and OST project</a:t>
+              <a:t>Suchith Shetty - HIUH69</a:t>
+            </a:r>
+          </a:p>
+        </p:txBody>
+      </p:sp>
+      <p:sp>
+        <p:nvSpPr>
+          <p:cNvPr id="198" name="Initial exploration of shared data to understand the fields and get some summary statistics…"/>
+          <p:cNvSpPr txBox="1"/>
+          <p:nvPr>
+            <p:ph type="body" idx="21"/>
+          </p:nvPr>
+        </p:nvSpPr>
+        <p:spPr>
+          <a:prstGeom prst="rect">
+            <a:avLst/>
+          </a:prstGeom>
+          <a:extLst>
+            <a:ext uri="{C572A759-6A51-4108-AA02-DFA0A04FC94B}">
+              <ma14:wrappingTextBoxFlag xmlns:ma14="http://schemas.microsoft.com/office/mac/drawingml/2011/main" val="1"/>
+            </a:ext>
+          </a:extLst>
+        </p:spPr>
+        <p:txBody>
+          <a:bodyPr/>
+          <a:lstStyle/>
+          <a:p>
+            <a:pPr marL="512062" indent="-512062" defTabSz="2048204">
+              <a:spcBef>
+                <a:spcPts val="3700"/>
+              </a:spcBef>
+              <a:defRPr sz="4000"/>
+            </a:pPr>
+            <a:r>
+              <a:t>    Initial exploration of shared data to understand the fields and get some summary statistics</a:t>
+            </a:r>
+          </a:p>
+          <a:p>
+            <a:pPr marL="512062" indent="-512062" defTabSz="2048204">
+              <a:spcBef>
+                <a:spcPts val="3700"/>
+              </a:spcBef>
+              <a:defRPr sz="4000"/>
+            </a:pPr>
+            <a:r>
+              <a:t>    Kafka producer module to load data from csv to Kafka topic using Python</a:t>
+            </a:r>
+          </a:p>
+          <a:p>
+            <a:pPr marL="512062" indent="-512062" defTabSz="2048204">
+              <a:spcBef>
+                <a:spcPts val="3700"/>
+              </a:spcBef>
+              <a:defRPr sz="4000"/>
+            </a:pPr>
+            <a:r>
+              <a:t>    Setting up ElasticSearch and Kibana on a third-party host (Bonsai) and in local machine</a:t>
+            </a:r>
+          </a:p>
+          <a:p>
+            <a:pPr marL="512062" indent="-512062" defTabSz="2048204">
+              <a:spcBef>
+                <a:spcPts val="3700"/>
+              </a:spcBef>
+              <a:defRPr sz="4000"/>
+            </a:pPr>
+            <a:r>
+              <a:t>    Kafka consumer module to stream data from Kafka to Elastic Search</a:t>
+            </a:r>
+          </a:p>
+          <a:p>
+            <a:pPr marL="512062" indent="-512062" defTabSz="2048204">
+              <a:spcBef>
+                <a:spcPts val="3700"/>
+              </a:spcBef>
+              <a:defRPr sz="4000"/>
+            </a:pPr>
+            <a:r>
+              <a:t>    Explore, create visualization charts and compile them to create output dashboard in Kibana</a:t>
+            </a:r>
+          </a:p>
+          <a:p>
+            <a:pPr marL="512062" indent="-512062" defTabSz="2048204">
+              <a:spcBef>
+                <a:spcPts val="3700"/>
+              </a:spcBef>
+              <a:defRPr sz="4000"/>
+            </a:pPr>
+            <a:r>
+              <a:t>    Contribute in stream transformations for anomaly detection and data engineering to make output streams compatible for easy visualization</a:t>
+            </a:r>
+          </a:p>
+          <a:p>
+            <a:pPr marL="512062" indent="-512062" defTabSz="2048204">
+              <a:spcBef>
+                <a:spcPts val="3700"/>
+              </a:spcBef>
+              <a:defRPr sz="4000"/>
+            </a:pPr>
+            <a:r>
+              <a:t>    Contribute in report writing and preparing presentation material</a:t>
+            </a:r>
+          </a:p>
+        </p:txBody>
+      </p:sp>
+    </p:spTree>
+  </p:cSld>
+  <p:clrMapOvr>
+    <a:masterClrMapping/>
+  </p:clrMapOvr>
+  <p:transition xmlns:p14="http://schemas.microsoft.com/office/powerpoint/2010/main" spd="med" advClick="1"/>
+</p:sld>
+</file>
+
+<file path=ppt/slides/slide12.xml><?xml version="1.0" encoding="utf-8"?>
+<p:sld xmlns:a="http://schemas.openxmlformats.org/drawingml/2006/main" xmlns:r="http://schemas.openxmlformats.org/officeDocument/2006/relationships" xmlns:p="http://schemas.openxmlformats.org/presentationml/2006/main" xmlns:m="http://schemas.openxmlformats.org/officeDocument/2006/math" xmlns:a14="http://schemas.microsoft.com/office/drawing/2010/main" showMasterSp="1" showMasterPhAnim="1">
+  <p:cSld>
+    <p:spTree>
+      <p:nvGrpSpPr>
+        <p:cNvPr id="1" name=""/>
+        <p:cNvGrpSpPr/>
+        <p:nvPr/>
+      </p:nvGrpSpPr>
+      <p:grpSpPr>
+        <a:xfrm>
+          <a:off x="0" y="0"/>
+          <a:ext cx="0" cy="0"/>
+          <a:chOff x="0" y="0"/>
+          <a:chExt cx="0" cy="0"/>
+        </a:xfrm>
+      </p:grpSpPr>
+      <p:sp>
+        <p:nvSpPr>
+          <p:cNvPr id="200" name="Thank you for your attention!"/>
+          <p:cNvSpPr txBox="1"/>
+          <p:nvPr>
+            <p:ph type="body" sz="half" idx="1"/>
+          </p:nvPr>
+        </p:nvSpPr>
+        <p:spPr>
+          <a:prstGeom prst="rect">
+            <a:avLst/>
+          </a:prstGeom>
+        </p:spPr>
+        <p:txBody>
+          <a:bodyPr/>
+          <a:lstStyle>
+            <a:lvl1pPr>
+              <a:defRPr spc="-300"/>
+            </a:lvl1pPr>
+          </a:lstStyle>
+          <a:p>
+            <a:pPr/>
+            <a:r>
+              <a:t>Thank you for your attention!</a:t>
             </a:r>
           </a:p>
         </p:txBody>
@@ -3945,18 +4492,50 @@
         </p:spPr>
         <p:txBody>
           <a:bodyPr/>
+          <a:lstStyle>
+            <a:lvl1pPr>
+              <a:defRPr spc="-200"/>
+            </a:lvl1pPr>
+          </a:lstStyle>
+          <a:p>
+            <a:pPr/>
+            <a:r>
+              <a:t>Datasets</a:t>
+            </a:r>
+          </a:p>
+        </p:txBody>
+      </p:sp>
+      <p:sp>
+        <p:nvSpPr>
+          <p:cNvPr id="156" name="balance_hist_anon.csv"/>
+          <p:cNvSpPr txBox="1"/>
+          <p:nvPr>
+            <p:ph type="body" sz="quarter" idx="1"/>
+          </p:nvPr>
+        </p:nvSpPr>
+        <p:spPr>
+          <a:xfrm>
+            <a:off x="1206500" y="2372961"/>
+            <a:ext cx="21971000" cy="934780"/>
+          </a:xfrm>
+          <a:prstGeom prst="rect">
+            <a:avLst/>
+          </a:prstGeom>
+        </p:spPr>
+        <p:txBody>
+          <a:bodyPr/>
           <a:lstStyle/>
           <a:p>
             <a:pPr/>
             <a:r>
-              <a:t>Datasets</a:t>
-            </a:r>
-          </a:p>
-        </p:txBody>
-      </p:sp>
-      <p:sp>
-        <p:nvSpPr>
-          <p:cNvPr id="156" name="balance_hist_anon.csv"/>
+              <a:t>balance_hist_anon.csv</a:t>
+            </a:r>
+          </a:p>
+        </p:txBody>
+      </p:sp>
+      <p:sp>
+        <p:nvSpPr>
+          <p:cNvPr id="157" name="EBIZ_BALANCE_ID…"/>
           <p:cNvSpPr txBox="1"/>
           <p:nvPr>
             <p:ph type="body" idx="21"/>
@@ -3971,30 +4550,6 @@
               <ma14:wrappingTextBoxFlag xmlns:ma14="http://schemas.microsoft.com/office/mac/drawingml/2011/main" val="1"/>
             </a:ext>
           </a:extLst>
-        </p:spPr>
-        <p:txBody>
-          <a:bodyPr/>
-          <a:lstStyle/>
-          <a:p>
-            <a:pPr/>
-            <a:r>
-              <a:t>balance_hist_anon.csv</a:t>
-            </a:r>
-          </a:p>
-        </p:txBody>
-      </p:sp>
-      <p:sp>
-        <p:nvSpPr>
-          <p:cNvPr id="157" name="EBIZ_BALANCE_ID…"/>
-          <p:cNvSpPr txBox="1"/>
-          <p:nvPr>
-            <p:ph type="body" idx="1"/>
-          </p:nvPr>
-        </p:nvSpPr>
-        <p:spPr>
-          <a:prstGeom prst="rect">
-            <a:avLst/>
-          </a:prstGeom>
         </p:spPr>
         <p:txBody>
           <a:bodyPr/>
@@ -4084,7 +4639,11 @@
         </p:spPr>
         <p:txBody>
           <a:bodyPr/>
-          <a:lstStyle/>
+          <a:lstStyle>
+            <a:lvl1pPr>
+              <a:defRPr spc="-200"/>
+            </a:lvl1pPr>
+          </a:lstStyle>
           <a:p>
             <a:pPr/>
             <a:r>
@@ -4098,18 +4657,17 @@
           <p:cNvPr id="160" name="eurofxref-hist.csv"/>
           <p:cNvSpPr txBox="1"/>
           <p:nvPr>
-            <p:ph type="body" idx="21"/>
-          </p:nvPr>
-        </p:nvSpPr>
-        <p:spPr>
-          <a:prstGeom prst="rect">
-            <a:avLst/>
-          </a:prstGeom>
-          <a:extLst>
-            <a:ext uri="{C572A759-6A51-4108-AA02-DFA0A04FC94B}">
-              <ma14:wrappingTextBoxFlag xmlns:ma14="http://schemas.microsoft.com/office/mac/drawingml/2011/main" val="1"/>
-            </a:ext>
-          </a:extLst>
+            <p:ph type="body" sz="quarter" idx="1"/>
+          </p:nvPr>
+        </p:nvSpPr>
+        <p:spPr>
+          <a:xfrm>
+            <a:off x="1206500" y="2372961"/>
+            <a:ext cx="21971000" cy="934780"/>
+          </a:xfrm>
+          <a:prstGeom prst="rect">
+            <a:avLst/>
+          </a:prstGeom>
         </p:spPr>
         <p:txBody>
           <a:bodyPr/>
@@ -4127,7 +4685,7 @@
           <p:cNvPr id="161" name="Slide bullet text"/>
           <p:cNvSpPr txBox="1"/>
           <p:nvPr>
-            <p:ph type="body" idx="1"/>
+            <p:ph type="body" idx="21"/>
           </p:nvPr>
         </p:nvSpPr>
         <p:spPr>
@@ -4161,8 +4719,8 @@
         </p:blipFill>
         <p:spPr>
           <a:xfrm>
-            <a:off x="4592498" y="3689934"/>
-            <a:ext cx="15199004" cy="9373152"/>
+            <a:off x="4592497" y="3689934"/>
+            <a:ext cx="15199006" cy="9373152"/>
           </a:xfrm>
           <a:prstGeom prst="rect">
             <a:avLst/>
@@ -4207,6 +4765,10 @@
           </p:nvPr>
         </p:nvSpPr>
         <p:spPr>
+          <a:xfrm>
+            <a:off x="1206500" y="1030370"/>
+            <a:ext cx="21971000" cy="2226483"/>
+          </a:xfrm>
           <a:prstGeom prst="rect">
             <a:avLst/>
           </a:prstGeom>
@@ -4215,9 +4777,19 @@
           <a:bodyPr/>
           <a:lstStyle/>
           <a:p>
-            <a:pPr/>
-            <a:r>
-              <a:t>Overall system architecture</a:t>
+            <a:pPr defTabSz="2170120">
+              <a:defRPr spc="-178" sz="7565"/>
+            </a:pPr>
+            <a:r>
+              <a:t>Overall system </a:t>
+            </a:r>
+          </a:p>
+          <a:p>
+            <a:pPr defTabSz="2170120">
+              <a:defRPr spc="-178" sz="7565"/>
+            </a:pPr>
+            <a:r>
+              <a:t>architecture</a:t>
             </a:r>
           </a:p>
         </p:txBody>
@@ -4227,10 +4799,42 @@
           <p:cNvPr id="165" name="System architecture"/>
           <p:cNvSpPr txBox="1"/>
           <p:nvPr>
+            <p:ph type="body" sz="quarter" idx="1"/>
+          </p:nvPr>
+        </p:nvSpPr>
+        <p:spPr>
+          <a:xfrm>
+            <a:off x="1206500" y="3285288"/>
+            <a:ext cx="21971001" cy="934780"/>
+          </a:xfrm>
+          <a:prstGeom prst="rect">
+            <a:avLst/>
+          </a:prstGeom>
+        </p:spPr>
+        <p:txBody>
+          <a:bodyPr/>
+          <a:lstStyle/>
+          <a:p>
+            <a:pPr/>
+            <a:r>
+              <a:t>System architecture</a:t>
+            </a:r>
+          </a:p>
+        </p:txBody>
+      </p:sp>
+      <p:sp>
+        <p:nvSpPr>
+          <p:cNvPr id="166" name="Jupyter Notebook…"/>
+          <p:cNvSpPr txBox="1"/>
+          <p:nvPr>
             <p:ph type="body" idx="21"/>
           </p:nvPr>
         </p:nvSpPr>
         <p:spPr>
+          <a:xfrm>
+            <a:off x="1206499" y="4773782"/>
+            <a:ext cx="21971001" cy="8256014"/>
+          </a:xfrm>
           <a:prstGeom prst="rect">
             <a:avLst/>
           </a:prstGeom>
@@ -4246,30 +4850,6 @@
           <a:p>
             <a:pPr/>
             <a:r>
-              <a:t>System architecture</a:t>
-            </a:r>
-          </a:p>
-        </p:txBody>
-      </p:sp>
-      <p:sp>
-        <p:nvSpPr>
-          <p:cNvPr id="166" name="Jupyter Notebook…"/>
-          <p:cNvSpPr txBox="1"/>
-          <p:nvPr>
-            <p:ph type="body" idx="1"/>
-          </p:nvPr>
-        </p:nvSpPr>
-        <p:spPr>
-          <a:prstGeom prst="rect">
-            <a:avLst/>
-          </a:prstGeom>
-        </p:spPr>
-        <p:txBody>
-          <a:bodyPr/>
-          <a:lstStyle/>
-          <a:p>
-            <a:pPr/>
-            <a:r>
               <a:t>Jupyter Notebook</a:t>
             </a:r>
           </a:p>
@@ -4301,7 +4881,7 @@
       </p:sp>
       <p:pic>
         <p:nvPicPr>
-          <p:cNvPr id="167" name="Architecture.png" descr="Architecture.png"/>
+          <p:cNvPr id="167" name="architecture.png" descr="architecture.png"/>
           <p:cNvPicPr>
             <a:picLocks noChangeAspect="1"/>
           </p:cNvPicPr>
@@ -4317,8 +4897,8 @@
         </p:blipFill>
         <p:spPr>
           <a:xfrm>
-            <a:off x="15808302" y="425926"/>
-            <a:ext cx="7736304" cy="12864148"/>
+            <a:off x="12255783" y="326757"/>
+            <a:ext cx="11757555" cy="13062486"/>
           </a:xfrm>
           <a:prstGeom prst="rect">
             <a:avLst/>
@@ -4369,7 +4949,11 @@
         </p:spPr>
         <p:txBody>
           <a:bodyPr/>
-          <a:lstStyle/>
+          <a:lstStyle>
+            <a:lvl1pPr>
+              <a:defRPr spc="-200"/>
+            </a:lvl1pPr>
+          </a:lstStyle>
           <a:p>
             <a:pPr/>
             <a:r>
@@ -4383,18 +4967,17 @@
           <p:cNvPr id="170" name="Merging datasets"/>
           <p:cNvSpPr txBox="1"/>
           <p:nvPr>
-            <p:ph type="body" idx="21"/>
-          </p:nvPr>
-        </p:nvSpPr>
-        <p:spPr>
-          <a:prstGeom prst="rect">
-            <a:avLst/>
-          </a:prstGeom>
-          <a:extLst>
-            <a:ext uri="{C572A759-6A51-4108-AA02-DFA0A04FC94B}">
-              <ma14:wrappingTextBoxFlag xmlns:ma14="http://schemas.microsoft.com/office/mac/drawingml/2011/main" val="1"/>
-            </a:ext>
-          </a:extLst>
+            <p:ph type="body" sz="quarter" idx="1"/>
+          </p:nvPr>
+        </p:nvSpPr>
+        <p:spPr>
+          <a:xfrm>
+            <a:off x="1206500" y="2372961"/>
+            <a:ext cx="21971000" cy="934780"/>
+          </a:xfrm>
+          <a:prstGeom prst="rect">
+            <a:avLst/>
+          </a:prstGeom>
         </p:spPr>
         <p:txBody>
           <a:bodyPr/>
@@ -4412,7 +4995,7 @@
           <p:cNvPr id="171" name="Slide bullet text"/>
           <p:cNvSpPr txBox="1"/>
           <p:nvPr>
-            <p:ph type="body" idx="1"/>
+            <p:ph type="body" idx="21"/>
           </p:nvPr>
         </p:nvSpPr>
         <p:spPr>
@@ -4430,7 +5013,7 @@
       </p:sp>
       <p:pic>
         <p:nvPicPr>
-          <p:cNvPr id="172" name="XxQLt.png" descr="XxQLt.png"/>
+          <p:cNvPr id="172" name="rates.png" descr="rates.png"/>
           <p:cNvPicPr>
             <a:picLocks noChangeAspect="1"/>
           </p:cNvPicPr>
@@ -4446,8 +5029,8 @@
         </p:blipFill>
         <p:spPr>
           <a:xfrm>
-            <a:off x="1408743" y="4355925"/>
-            <a:ext cx="20722951" cy="7256774"/>
+            <a:off x="2212220" y="3916748"/>
+            <a:ext cx="19959560" cy="9031622"/>
           </a:xfrm>
           <a:prstGeom prst="rect">
             <a:avLst/>
@@ -4498,18 +5081,50 @@
         </p:spPr>
         <p:txBody>
           <a:bodyPr/>
+          <a:lstStyle>
+            <a:lvl1pPr>
+              <a:defRPr spc="-200"/>
+            </a:lvl1pPr>
+          </a:lstStyle>
+          <a:p>
+            <a:pPr/>
+            <a:r>
+              <a:t>Kafka Streams</a:t>
+            </a:r>
+          </a:p>
+        </p:txBody>
+      </p:sp>
+      <p:sp>
+        <p:nvSpPr>
+          <p:cNvPr id="175" name="Filtering according to balance difference"/>
+          <p:cNvSpPr txBox="1"/>
+          <p:nvPr>
+            <p:ph type="body" sz="quarter" idx="1"/>
+          </p:nvPr>
+        </p:nvSpPr>
+        <p:spPr>
+          <a:xfrm>
+            <a:off x="1206500" y="2372961"/>
+            <a:ext cx="21971000" cy="934780"/>
+          </a:xfrm>
+          <a:prstGeom prst="rect">
+            <a:avLst/>
+          </a:prstGeom>
+        </p:spPr>
+        <p:txBody>
+          <a:bodyPr/>
           <a:lstStyle/>
           <a:p>
             <a:pPr/>
             <a:r>
-              <a:t>Kafka Streams</a:t>
-            </a:r>
-          </a:p>
-        </p:txBody>
-      </p:sp>
-      <p:sp>
-        <p:nvSpPr>
-          <p:cNvPr id="175" name="Filtering according to balance difference"/>
+              <a:t>Filtering according to balance difference</a:t>
+            </a:r>
+          </a:p>
+        </p:txBody>
+      </p:sp>
+      <p:sp>
+        <p:nvSpPr>
+          <p:cNvPr id="176" name="Previous account balance…"/>
           <p:cNvSpPr txBox="1"/>
           <p:nvPr>
             <p:ph type="body" idx="21"/>
@@ -4531,20 +5146,96 @@
           <a:p>
             <a:pPr/>
             <a:r>
-              <a:t>Filtering according to balance difference</a:t>
-            </a:r>
-          </a:p>
-        </p:txBody>
-      </p:sp>
-      <p:sp>
-        <p:nvSpPr>
-          <p:cNvPr id="176" name="Previous account balance…"/>
+              <a:t>Previous account balance</a:t>
+            </a:r>
+          </a:p>
+          <a:p>
+            <a:pPr/>
+            <a:r>
+              <a:t>Current account balance</a:t>
+            </a:r>
+          </a:p>
+          <a:p>
+            <a:pPr/>
+            <a:r>
+              <a:t>Difference</a:t>
+            </a:r>
+          </a:p>
+          <a:p>
+            <a:pPr/>
+            <a:r>
+              <a:t>Anomalous: 1000+ EUR</a:t>
+            </a:r>
+          </a:p>
+        </p:txBody>
+      </p:sp>
+    </p:spTree>
+  </p:cSld>
+  <p:clrMapOvr>
+    <a:masterClrMapping/>
+  </p:clrMapOvr>
+  <p:transition xmlns:p14="http://schemas.microsoft.com/office/powerpoint/2010/main" spd="med" advClick="1"/>
+</p:sld>
+</file>
+
+<file path=ppt/slides/slide7.xml><?xml version="1.0" encoding="utf-8"?>
+<p:sld xmlns:a="http://schemas.openxmlformats.org/drawingml/2006/main" xmlns:r="http://schemas.openxmlformats.org/officeDocument/2006/relationships" xmlns:p="http://schemas.openxmlformats.org/presentationml/2006/main" xmlns:m="http://schemas.openxmlformats.org/officeDocument/2006/math" xmlns:a14="http://schemas.microsoft.com/office/drawing/2010/main" showMasterSp="1" showMasterPhAnim="1">
+  <p:cSld>
+    <p:spTree>
+      <p:nvGrpSpPr>
+        <p:cNvPr id="1" name=""/>
+        <p:cNvGrpSpPr/>
+        <p:nvPr/>
+      </p:nvGrpSpPr>
+      <p:grpSpPr>
+        <a:xfrm>
+          <a:off x="0" y="0"/>
+          <a:ext cx="0" cy="0"/>
+          <a:chOff x="0" y="0"/>
+          <a:chExt cx="0" cy="0"/>
+        </a:xfrm>
+      </p:grpSpPr>
+      <p:sp>
+        <p:nvSpPr>
+          <p:cNvPr id="178" name="Docker"/>
           <p:cNvSpPr txBox="1"/>
           <p:nvPr>
-            <p:ph type="body" idx="1"/>
-          </p:nvPr>
-        </p:nvSpPr>
-        <p:spPr>
+            <p:ph type="title"/>
+          </p:nvPr>
+        </p:nvSpPr>
+        <p:spPr>
+          <a:prstGeom prst="rect">
+            <a:avLst/>
+          </a:prstGeom>
+        </p:spPr>
+        <p:txBody>
+          <a:bodyPr/>
+          <a:lstStyle>
+            <a:lvl1pPr>
+              <a:defRPr spc="-200"/>
+            </a:lvl1pPr>
+          </a:lstStyle>
+          <a:p>
+            <a:pPr/>
+            <a:r>
+              <a:t>Docker</a:t>
+            </a:r>
+          </a:p>
+        </p:txBody>
+      </p:sp>
+      <p:sp>
+        <p:nvSpPr>
+          <p:cNvPr id="179" name="Slide Subtitle"/>
+          <p:cNvSpPr txBox="1"/>
+          <p:nvPr>
+            <p:ph type="body" sz="quarter" idx="1"/>
+          </p:nvPr>
+        </p:nvSpPr>
+        <p:spPr>
+          <a:xfrm>
+            <a:off x="1206500" y="2372961"/>
+            <a:ext cx="21971000" cy="934780"/>
+          </a:xfrm>
           <a:prstGeom prst="rect">
             <a:avLst/>
           </a:prstGeom>
@@ -4554,26 +5245,417 @@
           <a:lstStyle/>
           <a:p>
             <a:pPr/>
-            <a:r>
-              <a:t>Previous account balance</a:t>
-            </a:r>
-          </a:p>
-          <a:p>
-            <a:pPr/>
-            <a:r>
-              <a:t>Current account balance</a:t>
-            </a:r>
-          </a:p>
-          <a:p>
-            <a:pPr/>
-            <a:r>
-              <a:t>Difference</a:t>
-            </a:r>
-          </a:p>
-          <a:p>
-            <a:pPr/>
-            <a:r>
-              <a:t>Anomalous: 1000+ EUR</a:t>
+          </a:p>
+        </p:txBody>
+      </p:sp>
+      <p:sp>
+        <p:nvSpPr>
+          <p:cNvPr id="180" name="Slide bullet text"/>
+          <p:cNvSpPr txBox="1"/>
+          <p:nvPr>
+            <p:ph type="body" idx="21"/>
+          </p:nvPr>
+        </p:nvSpPr>
+        <p:spPr>
+          <a:prstGeom prst="rect">
+            <a:avLst/>
+          </a:prstGeom>
+        </p:spPr>
+        <p:txBody>
+          <a:bodyPr/>
+          <a:lstStyle/>
+          <a:p>
+            <a:pPr/>
+          </a:p>
+        </p:txBody>
+      </p:sp>
+      <p:pic>
+        <p:nvPicPr>
+          <p:cNvPr id="181" name="Docker_snapshot.jpg" descr="Docker_snapshot.jpg"/>
+          <p:cNvPicPr>
+            <a:picLocks noChangeAspect="1"/>
+          </p:cNvPicPr>
+          <p:nvPr/>
+        </p:nvPicPr>
+        <p:blipFill>
+          <a:blip r:embed="rId2">
+            <a:extLst/>
+          </a:blip>
+          <a:stretch>
+            <a:fillRect/>
+          </a:stretch>
+        </p:blipFill>
+        <p:spPr>
+          <a:xfrm>
+            <a:off x="1081792" y="2407318"/>
+            <a:ext cx="22220416" cy="11415740"/>
+          </a:xfrm>
+          <a:prstGeom prst="rect">
+            <a:avLst/>
+          </a:prstGeom>
+          <a:ln w="12700">
+            <a:miter lim="400000"/>
+          </a:ln>
+        </p:spPr>
+      </p:pic>
+    </p:spTree>
+  </p:cSld>
+  <p:clrMapOvr>
+    <a:masterClrMapping/>
+  </p:clrMapOvr>
+  <p:transition xmlns:p14="http://schemas.microsoft.com/office/powerpoint/2010/main" spd="med" advClick="1"/>
+</p:sld>
+</file>
+
+<file path=ppt/slides/slide8.xml><?xml version="1.0" encoding="utf-8"?>
+<p:sld xmlns:a="http://schemas.openxmlformats.org/drawingml/2006/main" xmlns:r="http://schemas.openxmlformats.org/officeDocument/2006/relationships" xmlns:p="http://schemas.openxmlformats.org/presentationml/2006/main" xmlns:m="http://schemas.openxmlformats.org/officeDocument/2006/math" xmlns:a14="http://schemas.microsoft.com/office/drawing/2010/main" showMasterSp="1" showMasterPhAnim="1">
+  <p:cSld>
+    <p:spTree>
+      <p:nvGrpSpPr>
+        <p:cNvPr id="1" name=""/>
+        <p:cNvGrpSpPr/>
+        <p:nvPr/>
+      </p:nvGrpSpPr>
+      <p:grpSpPr>
+        <a:xfrm>
+          <a:off x="0" y="0"/>
+          <a:ext cx="0" cy="0"/>
+          <a:chOff x="0" y="0"/>
+          <a:chExt cx="0" cy="0"/>
+        </a:xfrm>
+      </p:grpSpPr>
+      <p:sp>
+        <p:nvSpPr>
+          <p:cNvPr id="183" name="Visualization"/>
+          <p:cNvSpPr txBox="1"/>
+          <p:nvPr>
+            <p:ph type="title"/>
+          </p:nvPr>
+        </p:nvSpPr>
+        <p:spPr>
+          <a:prstGeom prst="rect">
+            <a:avLst/>
+          </a:prstGeom>
+        </p:spPr>
+        <p:txBody>
+          <a:bodyPr/>
+          <a:lstStyle>
+            <a:lvl1pPr>
+              <a:defRPr spc="-200"/>
+            </a:lvl1pPr>
+          </a:lstStyle>
+          <a:p>
+            <a:pPr/>
+            <a:r>
+              <a:t>Visualization</a:t>
+            </a:r>
+          </a:p>
+        </p:txBody>
+      </p:sp>
+      <p:sp>
+        <p:nvSpPr>
+          <p:cNvPr id="184" name="Kibana"/>
+          <p:cNvSpPr txBox="1"/>
+          <p:nvPr>
+            <p:ph type="body" sz="quarter" idx="1"/>
+          </p:nvPr>
+        </p:nvSpPr>
+        <p:spPr>
+          <a:xfrm>
+            <a:off x="1206500" y="2372961"/>
+            <a:ext cx="21971000" cy="934780"/>
+          </a:xfrm>
+          <a:prstGeom prst="rect">
+            <a:avLst/>
+          </a:prstGeom>
+        </p:spPr>
+        <p:txBody>
+          <a:bodyPr/>
+          <a:lstStyle/>
+          <a:p>
+            <a:pPr/>
+            <a:r>
+              <a:t>Kibana</a:t>
+            </a:r>
+          </a:p>
+        </p:txBody>
+      </p:sp>
+      <p:sp>
+        <p:nvSpPr>
+          <p:cNvPr id="185" name="Slide bullet text"/>
+          <p:cNvSpPr txBox="1"/>
+          <p:nvPr>
+            <p:ph type="body" idx="21"/>
+          </p:nvPr>
+        </p:nvSpPr>
+        <p:spPr>
+          <a:prstGeom prst="rect">
+            <a:avLst/>
+          </a:prstGeom>
+        </p:spPr>
+        <p:txBody>
+          <a:bodyPr/>
+          <a:lstStyle/>
+          <a:p>
+            <a:pPr/>
+          </a:p>
+        </p:txBody>
+      </p:sp>
+      <p:pic>
+        <p:nvPicPr>
+          <p:cNvPr id="186" name="Dashboard_snapshot.PNG" descr="Dashboard_snapshot.PNG"/>
+          <p:cNvPicPr>
+            <a:picLocks noChangeAspect="1"/>
+          </p:cNvPicPr>
+          <p:nvPr/>
+        </p:nvPicPr>
+        <p:blipFill>
+          <a:blip r:embed="rId2">
+            <a:extLst/>
+          </a:blip>
+          <a:stretch>
+            <a:fillRect/>
+          </a:stretch>
+        </p:blipFill>
+        <p:spPr>
+          <a:xfrm>
+            <a:off x="4215751" y="2608272"/>
+            <a:ext cx="19816446" cy="10768250"/>
+          </a:xfrm>
+          <a:prstGeom prst="rect">
+            <a:avLst/>
+          </a:prstGeom>
+          <a:ln w="12700">
+            <a:miter lim="400000"/>
+          </a:ln>
+        </p:spPr>
+      </p:pic>
+    </p:spTree>
+  </p:cSld>
+  <p:clrMapOvr>
+    <a:masterClrMapping/>
+  </p:clrMapOvr>
+  <p:transition xmlns:p14="http://schemas.microsoft.com/office/powerpoint/2010/main" spd="med" advClick="1"/>
+</p:sld>
+</file>
+
+<file path=ppt/slides/slide9.xml><?xml version="1.0" encoding="utf-8"?>
+<p:sld xmlns:a="http://schemas.openxmlformats.org/drawingml/2006/main" xmlns:r="http://schemas.openxmlformats.org/officeDocument/2006/relationships" xmlns:p="http://schemas.openxmlformats.org/presentationml/2006/main" xmlns:m="http://schemas.openxmlformats.org/officeDocument/2006/math" xmlns:a14="http://schemas.microsoft.com/office/drawing/2010/main" showMasterSp="1" showMasterPhAnim="1">
+  <p:cSld>
+    <p:spTree>
+      <p:nvGrpSpPr>
+        <p:cNvPr id="1" name=""/>
+        <p:cNvGrpSpPr/>
+        <p:nvPr/>
+      </p:nvGrpSpPr>
+      <p:grpSpPr>
+        <a:xfrm>
+          <a:off x="0" y="0"/>
+          <a:ext cx="0" cy="0"/>
+          <a:chOff x="0" y="0"/>
+          <a:chExt cx="0" cy="0"/>
+        </a:xfrm>
+      </p:grpSpPr>
+      <p:sp>
+        <p:nvSpPr>
+          <p:cNvPr id="188" name="Contributions"/>
+          <p:cNvSpPr txBox="1"/>
+          <p:nvPr>
+            <p:ph type="title"/>
+          </p:nvPr>
+        </p:nvSpPr>
+        <p:spPr>
+          <a:prstGeom prst="rect">
+            <a:avLst/>
+          </a:prstGeom>
+        </p:spPr>
+        <p:txBody>
+          <a:bodyPr/>
+          <a:lstStyle>
+            <a:lvl1pPr>
+              <a:defRPr spc="-200"/>
+            </a:lvl1pPr>
+          </a:lstStyle>
+          <a:p>
+            <a:pPr/>
+            <a:r>
+              <a:t>Contributions</a:t>
+            </a:r>
+          </a:p>
+        </p:txBody>
+      </p:sp>
+      <p:sp>
+        <p:nvSpPr>
+          <p:cNvPr id="189" name="Rakhimov Gayrat - IGMQ0T"/>
+          <p:cNvSpPr txBox="1"/>
+          <p:nvPr>
+            <p:ph type="body" sz="quarter" idx="1"/>
+          </p:nvPr>
+        </p:nvSpPr>
+        <p:spPr>
+          <a:xfrm>
+            <a:off x="1206500" y="2372961"/>
+            <a:ext cx="21971000" cy="934780"/>
+          </a:xfrm>
+          <a:prstGeom prst="rect">
+            <a:avLst/>
+          </a:prstGeom>
+        </p:spPr>
+        <p:txBody>
+          <a:bodyPr/>
+          <a:lstStyle/>
+          <a:p>
+            <a:pPr/>
+            <a:r>
+              <a:t>Rakhimov Gayrat - IGMQ0T</a:t>
+            </a:r>
+          </a:p>
+        </p:txBody>
+      </p:sp>
+      <p:sp>
+        <p:nvSpPr>
+          <p:cNvPr id="190" name="Data preprocessing on Jupyter Notebook: modifying balance and exchange rates data…"/>
+          <p:cNvSpPr txBox="1"/>
+          <p:nvPr>
+            <p:ph type="body" idx="21"/>
+          </p:nvPr>
+        </p:nvSpPr>
+        <p:spPr>
+          <a:xfrm>
+            <a:off x="1206500" y="3475597"/>
+            <a:ext cx="21971000" cy="9801826"/>
+          </a:xfrm>
+          <a:prstGeom prst="rect">
+            <a:avLst/>
+          </a:prstGeom>
+          <a:extLst>
+            <a:ext uri="{C572A759-6A51-4108-AA02-DFA0A04FC94B}">
+              <ma14:wrappingTextBoxFlag xmlns:ma14="http://schemas.microsoft.com/office/mac/drawingml/2011/main" val="1"/>
+            </a:ext>
+          </a:extLst>
+        </p:spPr>
+        <p:txBody>
+          <a:bodyPr/>
+          <a:lstStyle/>
+          <a:p>
+            <a:pPr marL="432815" indent="-432815" defTabSz="1731219">
+              <a:spcBef>
+                <a:spcPts val="3100"/>
+              </a:spcBef>
+              <a:defRPr sz="3400"/>
+            </a:pPr>
+            <a:r>
+              <a:t>    Data preprocessing on Jupyter Notebook: modifying balance and exchange rates data</a:t>
+            </a:r>
+          </a:p>
+          <a:p>
+            <a:pPr marL="432815" indent="-432815" defTabSz="1731219">
+              <a:spcBef>
+                <a:spcPts val="3100"/>
+              </a:spcBef>
+              <a:defRPr sz="3400"/>
+            </a:pPr>
+            <a:r>
+              <a:t>    Setting up Kafka Connect to read balance data into 'balance\_topic' stream</a:t>
+            </a:r>
+          </a:p>
+          <a:p>
+            <a:pPr marL="432815" indent="-432815" defTabSz="1731219">
+              <a:spcBef>
+                <a:spcPts val="3100"/>
+              </a:spcBef>
+              <a:defRPr sz="3400"/>
+            </a:pPr>
+            <a:r>
+              <a:t>    Reading Twitter tweets feed from Twitter API</a:t>
+            </a:r>
+          </a:p>
+          <a:p>
+            <a:pPr marL="432815" indent="-432815" defTabSz="1731219">
+              <a:spcBef>
+                <a:spcPts val="3100"/>
+              </a:spcBef>
+              <a:defRPr sz="3400"/>
+            </a:pPr>
+            <a:r>
+              <a:t>    Merging balance data and exchange data</a:t>
+            </a:r>
+          </a:p>
+          <a:p>
+            <a:pPr marL="432815" indent="-432815" defTabSz="1731219">
+              <a:spcBef>
+                <a:spcPts val="3100"/>
+              </a:spcBef>
+              <a:defRPr sz="3400"/>
+            </a:pPr>
+            <a:r>
+              <a:t>    Filtering balance data according to balance differences</a:t>
+            </a:r>
+          </a:p>
+          <a:p>
+            <a:pPr marL="432815" indent="-432815" defTabSz="1731219">
+              <a:spcBef>
+                <a:spcPts val="3100"/>
+              </a:spcBef>
+              <a:defRPr sz="3400"/>
+            </a:pPr>
+            <a:r>
+              <a:t>    Setting up remote ElasticSearch on a third-party host (Bonsai)</a:t>
+            </a:r>
+          </a:p>
+          <a:p>
+            <a:pPr marL="432815" indent="-432815" defTabSz="1731219">
+              <a:spcBef>
+                <a:spcPts val="3100"/>
+              </a:spcBef>
+              <a:defRPr sz="3400"/>
+            </a:pPr>
+            <a:r>
+              <a:t>    Storing Twitter data on ElasticSearch</a:t>
+            </a:r>
+          </a:p>
+          <a:p>
+            <a:pPr marL="432815" indent="-432815" defTabSz="1731219">
+              <a:spcBef>
+                <a:spcPts val="3100"/>
+              </a:spcBef>
+              <a:defRPr sz="3400"/>
+            </a:pPr>
+            <a:r>
+              <a:t>    Code repository management on Github: creating repository, reviewing pull requests and access management</a:t>
+            </a:r>
+          </a:p>
+          <a:p>
+            <a:pPr marL="432815" indent="-432815" defTabSz="1731219">
+              <a:spcBef>
+                <a:spcPts val="3100"/>
+              </a:spcBef>
+              <a:defRPr sz="3400"/>
+            </a:pPr>
+            <a:r>
+              <a:t>    Participating in project team's meetings</a:t>
+            </a:r>
+          </a:p>
+          <a:p>
+            <a:pPr marL="432815" indent="-432815" defTabSz="1731219">
+              <a:spcBef>
+                <a:spcPts val="3100"/>
+              </a:spcBef>
+              <a:defRPr sz="3400"/>
+            </a:pPr>
+            <a:r>
+              <a:t>    Writing report</a:t>
+            </a:r>
+          </a:p>
+          <a:p>
+            <a:pPr marL="432815" indent="-432815" defTabSz="1731219">
+              <a:spcBef>
+                <a:spcPts val="3100"/>
+              </a:spcBef>
+              <a:defRPr sz="3400"/>
+            </a:pPr>
+            <a:r>
+              <a:t>    Preparing presentation material</a:t>
             </a:r>
           </a:p>
         </p:txBody>
@@ -4598,10 +5680,10 @@
         <a:srgbClr val="FFFFFF"/>
       </a:lt1>
       <a:dk2>
-        <a:srgbClr val="5E5E5E"/>
+        <a:srgbClr val="A7A7A7"/>
       </a:dk2>
       <a:lt2>
-        <a:srgbClr val="D5D5D5"/>
+        <a:srgbClr val="535353"/>
       </a:lt2>
       <a:accent1>
         <a:srgbClr val="00A2FF"/>
@@ -4635,9 +5717,9 @@
         <a:cs typeface="Helvetica Neue"/>
       </a:majorFont>
       <a:minorFont>
-        <a:latin typeface="Helvetica Neue"/>
-        <a:ea typeface="Helvetica Neue"/>
-        <a:cs typeface="Helvetica Neue"/>
+        <a:latin typeface="Helvetica"/>
+        <a:ea typeface="Helvetica"/>
+        <a:cs typeface="Helvetica"/>
       </a:minorFont>
     </a:fontScheme>
     <a:fmtScheme name="21_BasicWhite">
@@ -4778,11 +5860,14 @@
     <a:spDef>
       <a:spPr>
         <a:solidFill>
-          <a:srgbClr val="000000"/>
+          <a:srgbClr val="FFFFFF"/>
         </a:solidFill>
-        <a:ln w="12700" cap="flat">
-          <a:noFill/>
-          <a:miter lim="400000"/>
+        <a:ln w="25400" cap="flat">
+          <a:solidFill>
+            <a:schemeClr val="accent1"/>
+          </a:solidFill>
+          <a:prstDash val="solid"/>
+          <a:round/>
         </a:ln>
         <a:effectLst/>
         <a:sp3d/>
@@ -4791,7 +5876,7 @@
         <a:spAutoFit/>
       </a:bodyPr>
       <a:lstStyle>
-        <a:defPPr marL="0" marR="0" indent="0" algn="ctr" defTabSz="825500" rtl="0" fontAlgn="auto" latinLnBrk="0" hangingPunct="0">
+        <a:defPPr marL="0" marR="0" indent="0" algn="ctr" defTabSz="2438337" rtl="0" fontAlgn="auto" latinLnBrk="0" hangingPunct="0">
           <a:lnSpc>
             <a:spcPct val="100000"/>
           </a:lnSpc>
@@ -4806,19 +5891,19 @@
           <a:buFontTx/>
           <a:buNone/>
           <a:tabLst/>
-          <a:defRPr b="0" baseline="0" cap="none" i="0" spc="0" strike="noStrike" sz="3200" u="none" kumimoji="0" normalizeH="0">
+          <a:defRPr b="0" baseline="0" cap="none" i="0" spc="0" strike="noStrike" sz="2400" u="none" kumimoji="0" normalizeH="0">
             <a:ln>
               <a:noFill/>
             </a:ln>
             <a:solidFill>
-              <a:srgbClr val="FFFFFF"/>
+              <a:srgbClr val="5E5E5E"/>
             </a:solidFill>
             <a:effectLst/>
             <a:uFillTx/>
-            <a:latin typeface="Helvetica Neue Medium"/>
-            <a:ea typeface="Helvetica Neue Medium"/>
-            <a:cs typeface="Helvetica Neue Medium"/>
-            <a:sym typeface="Helvetica Neue Medium"/>
+            <a:latin typeface="+mj-lt"/>
+            <a:ea typeface="+mj-ea"/>
+            <a:cs typeface="+mj-cs"/>
+            <a:sym typeface="Helvetica Neue"/>
           </a:defRPr>
         </a:defPPr>
         <a:lvl1pPr marL="0" marR="0" indent="0" algn="l" defTabSz="914400" rtl="0" fontAlgn="auto" latinLnBrk="1" hangingPunct="0">
@@ -5068,10 +6153,10 @@
         <a:noFill/>
         <a:ln w="25400" cap="flat">
           <a:solidFill>
-            <a:srgbClr val="000000"/>
+            <a:schemeClr val="accent1"/>
           </a:solidFill>
           <a:prstDash val="solid"/>
-          <a:miter lim="400000"/>
+          <a:round/>
         </a:ln>
         <a:effectLst/>
         <a:sp3d/>
@@ -5362,7 +6447,7 @@
         <a:spAutoFit/>
       </a:bodyPr>
       <a:lstStyle>
-        <a:defPPr marL="0" marR="0" indent="0" algn="ctr" defTabSz="2438338" rtl="0" fontAlgn="auto" latinLnBrk="0" hangingPunct="0">
+        <a:defPPr marL="0" marR="0" indent="0" algn="ctr" defTabSz="2438337" rtl="0" fontAlgn="auto" latinLnBrk="0" hangingPunct="0">
           <a:lnSpc>
             <a:spcPct val="100000"/>
           </a:lnSpc>
@@ -5386,9 +6471,9 @@
             </a:solidFill>
             <a:effectLst/>
             <a:uFillTx/>
-            <a:latin typeface="+mn-lt"/>
-            <a:ea typeface="+mn-ea"/>
-            <a:cs typeface="+mn-cs"/>
+            <a:latin typeface="+mj-lt"/>
+            <a:ea typeface="+mj-ea"/>
+            <a:cs typeface="+mj-cs"/>
             <a:sym typeface="Helvetica Neue"/>
           </a:defRPr>
         </a:defPPr>
@@ -5649,10 +6734,10 @@
         <a:srgbClr val="FFFFFF"/>
       </a:lt1>
       <a:dk2>
-        <a:srgbClr val="5E5E5E"/>
+        <a:srgbClr val="A7A7A7"/>
       </a:dk2>
       <a:lt2>
-        <a:srgbClr val="D5D5D5"/>
+        <a:srgbClr val="535353"/>
       </a:lt2>
       <a:accent1>
         <a:srgbClr val="00A2FF"/>
@@ -5686,9 +6771,9 @@
         <a:cs typeface="Helvetica Neue"/>
       </a:majorFont>
       <a:minorFont>
-        <a:latin typeface="Helvetica Neue"/>
-        <a:ea typeface="Helvetica Neue"/>
-        <a:cs typeface="Helvetica Neue"/>
+        <a:latin typeface="Helvetica"/>
+        <a:ea typeface="Helvetica"/>
+        <a:cs typeface="Helvetica"/>
       </a:minorFont>
     </a:fontScheme>
     <a:fmtScheme name="21_BasicWhite">
@@ -5829,11 +6914,14 @@
     <a:spDef>
       <a:spPr>
         <a:solidFill>
-          <a:srgbClr val="000000"/>
+          <a:srgbClr val="FFFFFF"/>
         </a:solidFill>
-        <a:ln w="12700" cap="flat">
-          <a:noFill/>
-          <a:miter lim="400000"/>
+        <a:ln w="25400" cap="flat">
+          <a:solidFill>
+            <a:schemeClr val="accent1"/>
+          </a:solidFill>
+          <a:prstDash val="solid"/>
+          <a:round/>
         </a:ln>
         <a:effectLst/>
         <a:sp3d/>
@@ -5842,7 +6930,7 @@
         <a:spAutoFit/>
       </a:bodyPr>
       <a:lstStyle>
-        <a:defPPr marL="0" marR="0" indent="0" algn="ctr" defTabSz="825500" rtl="0" fontAlgn="auto" latinLnBrk="0" hangingPunct="0">
+        <a:defPPr marL="0" marR="0" indent="0" algn="ctr" defTabSz="2438337" rtl="0" fontAlgn="auto" latinLnBrk="0" hangingPunct="0">
           <a:lnSpc>
             <a:spcPct val="100000"/>
           </a:lnSpc>
@@ -5857,19 +6945,19 @@
           <a:buFontTx/>
           <a:buNone/>
           <a:tabLst/>
-          <a:defRPr b="0" baseline="0" cap="none" i="0" spc="0" strike="noStrike" sz="3200" u="none" kumimoji="0" normalizeH="0">
+          <a:defRPr b="0" baseline="0" cap="none" i="0" spc="0" strike="noStrike" sz="2400" u="none" kumimoji="0" normalizeH="0">
             <a:ln>
               <a:noFill/>
             </a:ln>
             <a:solidFill>
-              <a:srgbClr val="FFFFFF"/>
+              <a:srgbClr val="5E5E5E"/>
             </a:solidFill>
             <a:effectLst/>
             <a:uFillTx/>
-            <a:latin typeface="Helvetica Neue Medium"/>
-            <a:ea typeface="Helvetica Neue Medium"/>
-            <a:cs typeface="Helvetica Neue Medium"/>
-            <a:sym typeface="Helvetica Neue Medium"/>
+            <a:latin typeface="+mj-lt"/>
+            <a:ea typeface="+mj-ea"/>
+            <a:cs typeface="+mj-cs"/>
+            <a:sym typeface="Helvetica Neue"/>
           </a:defRPr>
         </a:defPPr>
         <a:lvl1pPr marL="0" marR="0" indent="0" algn="l" defTabSz="914400" rtl="0" fontAlgn="auto" latinLnBrk="1" hangingPunct="0">
@@ -6119,10 +7207,10 @@
         <a:noFill/>
         <a:ln w="25400" cap="flat">
           <a:solidFill>
-            <a:srgbClr val="000000"/>
+            <a:schemeClr val="accent1"/>
           </a:solidFill>
           <a:prstDash val="solid"/>
-          <a:miter lim="400000"/>
+          <a:round/>
         </a:ln>
         <a:effectLst/>
         <a:sp3d/>
@@ -6413,7 +7501,7 @@
         <a:spAutoFit/>
       </a:bodyPr>
       <a:lstStyle>
-        <a:defPPr marL="0" marR="0" indent="0" algn="ctr" defTabSz="2438338" rtl="0" fontAlgn="auto" latinLnBrk="0" hangingPunct="0">
+        <a:defPPr marL="0" marR="0" indent="0" algn="ctr" defTabSz="2438337" rtl="0" fontAlgn="auto" latinLnBrk="0" hangingPunct="0">
           <a:lnSpc>
             <a:spcPct val="100000"/>
           </a:lnSpc>
@@ -6437,9 +7525,9 @@
             </a:solidFill>
             <a:effectLst/>
             <a:uFillTx/>
-            <a:latin typeface="+mn-lt"/>
-            <a:ea typeface="+mn-ea"/>
-            <a:cs typeface="+mn-cs"/>
+            <a:latin typeface="+mj-lt"/>
+            <a:ea typeface="+mj-ea"/>
+            <a:cs typeface="+mj-cs"/>
             <a:sym typeface="Helvetica Neue"/>
           </a:defRPr>
         </a:defPPr>

</xml_diff>